<commit_message>
manga v(2.4.0.0) Gradle 'createExe' task + Command line argument support
- We include the Launch4j into Gradle. No need to make Jar any more, just we can type 'gradle createExe' andy changing the value of mainClass parameter.

- JSAP is also included to manage the command line arguments. now you can run the client passing its arguments on the command line like this:
$ equiz-client.exe -h localhost --port 10000 -u "sami fattani" -i MBA001

- Blank field now can be also used as Essay. I change the textField into textArea. It works fine.
</commit_message>
<xml_diff>
--- a/data/Design.pptx
+++ b/data/Design.pptx
@@ -251,7 +251,7 @@
           </a:lstStyle>
           <a:p>
             <a:r>
-              <a:rPr lang="en-US" smtClean="0"/>
+              <a:rPr lang="en-US"/>
               <a:t>Click to edit Master title style</a:t>
             </a:r>
             <a:endParaRPr lang="en-US" dirty="0"/>
@@ -323,7 +323,7 @@
           </a:lstStyle>
           <a:p>
             <a:r>
-              <a:rPr lang="en-US" smtClean="0"/>
+              <a:rPr lang="en-US"/>
               <a:t>Click to edit Master subtitle style</a:t>
             </a:r>
             <a:endParaRPr lang="en-US" dirty="0"/>
@@ -347,7 +347,7 @@
           <a:p>
             <a:fld id="{FCC48F40-D526-46B5-AAE0-C515735D5BAE}" type="datetimeFigureOut">
               <a:rPr lang="en-US" smtClean="0"/>
-              <a:t>13-12-2016</a:t>
+              <a:t>2/5/2017</a:t>
             </a:fld>
             <a:endParaRPr lang="en-US"/>
           </a:p>
@@ -479,7 +479,7 @@
           <a:lstStyle/>
           <a:p>
             <a:r>
-              <a:rPr lang="en-US" smtClean="0"/>
+              <a:rPr lang="en-US"/>
               <a:t>Click to edit Master title style</a:t>
             </a:r>
             <a:endParaRPr lang="en-US" dirty="0"/>
@@ -503,35 +503,35 @@
           <a:p>
             <a:pPr lvl="0"/>
             <a:r>
-              <a:rPr lang="en-US" smtClean="0"/>
+              <a:rPr lang="en-US"/>
               <a:t>Edit Master text styles</a:t>
             </a:r>
           </a:p>
           <a:p>
             <a:pPr lvl="1"/>
             <a:r>
-              <a:rPr lang="en-US" smtClean="0"/>
+              <a:rPr lang="en-US"/>
               <a:t>Second level</a:t>
             </a:r>
           </a:p>
           <a:p>
             <a:pPr lvl="2"/>
             <a:r>
-              <a:rPr lang="en-US" smtClean="0"/>
+              <a:rPr lang="en-US"/>
               <a:t>Third level</a:t>
             </a:r>
           </a:p>
           <a:p>
             <a:pPr lvl="3"/>
             <a:r>
-              <a:rPr lang="en-US" smtClean="0"/>
+              <a:rPr lang="en-US"/>
               <a:t>Fourth level</a:t>
             </a:r>
           </a:p>
           <a:p>
             <a:pPr lvl="4"/>
             <a:r>
-              <a:rPr lang="en-US" smtClean="0"/>
+              <a:rPr lang="en-US"/>
               <a:t>Fifth level</a:t>
             </a:r>
             <a:endParaRPr lang="en-US" dirty="0"/>
@@ -555,7 +555,7 @@
           <a:p>
             <a:fld id="{FCC48F40-D526-46B5-AAE0-C515735D5BAE}" type="datetimeFigureOut">
               <a:rPr lang="en-US" smtClean="0"/>
-              <a:t>13-12-2016</a:t>
+              <a:t>2/5/2017</a:t>
             </a:fld>
             <a:endParaRPr lang="en-US"/>
           </a:p>
@@ -730,7 +730,7 @@
           <a:lstStyle/>
           <a:p>
             <a:r>
-              <a:rPr lang="en-US" smtClean="0"/>
+              <a:rPr lang="en-US"/>
               <a:t>Click to edit Master title style</a:t>
             </a:r>
             <a:endParaRPr lang="en-US" dirty="0"/>
@@ -759,35 +759,35 @@
           <a:p>
             <a:pPr lvl="0"/>
             <a:r>
-              <a:rPr lang="en-US" smtClean="0"/>
+              <a:rPr lang="en-US"/>
               <a:t>Edit Master text styles</a:t>
             </a:r>
           </a:p>
           <a:p>
             <a:pPr lvl="1"/>
             <a:r>
-              <a:rPr lang="en-US" smtClean="0"/>
+              <a:rPr lang="en-US"/>
               <a:t>Second level</a:t>
             </a:r>
           </a:p>
           <a:p>
             <a:pPr lvl="2"/>
             <a:r>
-              <a:rPr lang="en-US" smtClean="0"/>
+              <a:rPr lang="en-US"/>
               <a:t>Third level</a:t>
             </a:r>
           </a:p>
           <a:p>
             <a:pPr lvl="3"/>
             <a:r>
-              <a:rPr lang="en-US" smtClean="0"/>
+              <a:rPr lang="en-US"/>
               <a:t>Fourth level</a:t>
             </a:r>
           </a:p>
           <a:p>
             <a:pPr lvl="4"/>
             <a:r>
-              <a:rPr lang="en-US" smtClean="0"/>
+              <a:rPr lang="en-US"/>
               <a:t>Fifth level</a:t>
             </a:r>
             <a:endParaRPr lang="en-US" dirty="0"/>
@@ -811,7 +811,7 @@
           <a:p>
             <a:fld id="{FCC48F40-D526-46B5-AAE0-C515735D5BAE}" type="datetimeFigureOut">
               <a:rPr lang="en-US" smtClean="0"/>
-              <a:t>13-12-2016</a:t>
+              <a:t>2/5/2017</a:t>
             </a:fld>
             <a:endParaRPr lang="en-US"/>
           </a:p>
@@ -918,10 +918,9 @@
           </a:lstStyle>
           <a:p>
             <a:r>
-              <a:rPr lang="en-US" dirty="0" smtClean="0"/>
+              <a:rPr lang="en-US" dirty="0"/>
               <a:t>Click to edit Master title style</a:t>
             </a:r>
-            <a:endParaRPr lang="en-US" dirty="0"/>
           </a:p>
         </p:txBody>
       </p:sp>
@@ -965,38 +964,37 @@
           <a:p>
             <a:pPr lvl="0"/>
             <a:r>
-              <a:rPr lang="en-US" dirty="0" smtClean="0"/>
+              <a:rPr lang="en-US" dirty="0"/>
               <a:t>Edit Master text styles</a:t>
             </a:r>
           </a:p>
           <a:p>
             <a:pPr lvl="1"/>
             <a:r>
-              <a:rPr lang="en-US" dirty="0" smtClean="0"/>
+              <a:rPr lang="en-US" dirty="0"/>
               <a:t>Second level</a:t>
             </a:r>
           </a:p>
           <a:p>
             <a:pPr lvl="2"/>
             <a:r>
-              <a:rPr lang="en-US" dirty="0" smtClean="0"/>
+              <a:rPr lang="en-US" dirty="0"/>
               <a:t>Third level</a:t>
             </a:r>
           </a:p>
           <a:p>
             <a:pPr lvl="3"/>
             <a:r>
-              <a:rPr lang="en-US" dirty="0" smtClean="0"/>
+              <a:rPr lang="en-US" dirty="0"/>
               <a:t>Fourth level</a:t>
             </a:r>
           </a:p>
           <a:p>
             <a:pPr lvl="4"/>
             <a:r>
-              <a:rPr lang="en-US" dirty="0" smtClean="0"/>
+              <a:rPr lang="en-US" dirty="0"/>
               <a:t>Fifth level</a:t>
             </a:r>
-            <a:endParaRPr lang="en-US" dirty="0"/>
           </a:p>
         </p:txBody>
       </p:sp>
@@ -1027,7 +1025,7 @@
             <a:fld id="{FCC48F40-D526-46B5-AAE0-C515735D5BAE}" type="datetimeFigureOut">
               <a:rPr lang="en-US" smtClean="0"/>
               <a:pPr/>
-              <a:t>13-12-2016</a:t>
+              <a:t>2/5/2017</a:t>
             </a:fld>
             <a:endParaRPr lang="en-US"/>
           </a:p>
@@ -1217,7 +1215,7 @@
           </a:lstStyle>
           <a:p>
             <a:r>
-              <a:rPr lang="en-US" smtClean="0"/>
+              <a:rPr lang="en-US"/>
               <a:t>Click to edit Master title style</a:t>
             </a:r>
             <a:endParaRPr lang="en-US" dirty="0"/>
@@ -1338,7 +1336,7 @@
           <a:p>
             <a:pPr lvl="0"/>
             <a:r>
-              <a:rPr lang="en-US" smtClean="0"/>
+              <a:rPr lang="en-US"/>
               <a:t>Edit Master text styles</a:t>
             </a:r>
           </a:p>
@@ -1361,7 +1359,7 @@
           <a:p>
             <a:fld id="{FCC48F40-D526-46B5-AAE0-C515735D5BAE}" type="datetimeFigureOut">
               <a:rPr lang="en-US" smtClean="0"/>
-              <a:t>13-12-2016</a:t>
+              <a:t>2/5/2017</a:t>
             </a:fld>
             <a:endParaRPr lang="en-US"/>
           </a:p>
@@ -1498,7 +1496,7 @@
           <a:lstStyle/>
           <a:p>
             <a:r>
-              <a:rPr lang="en-US" smtClean="0"/>
+              <a:rPr lang="en-US"/>
               <a:t>Click to edit Master title style</a:t>
             </a:r>
             <a:endParaRPr lang="en-US" dirty="0"/>
@@ -1527,35 +1525,35 @@
           <a:p>
             <a:pPr lvl="0"/>
             <a:r>
-              <a:rPr lang="en-US" smtClean="0"/>
+              <a:rPr lang="en-US"/>
               <a:t>Edit Master text styles</a:t>
             </a:r>
           </a:p>
           <a:p>
             <a:pPr lvl="1"/>
             <a:r>
-              <a:rPr lang="en-US" smtClean="0"/>
+              <a:rPr lang="en-US"/>
               <a:t>Second level</a:t>
             </a:r>
           </a:p>
           <a:p>
             <a:pPr lvl="2"/>
             <a:r>
-              <a:rPr lang="en-US" smtClean="0"/>
+              <a:rPr lang="en-US"/>
               <a:t>Third level</a:t>
             </a:r>
           </a:p>
           <a:p>
             <a:pPr lvl="3"/>
             <a:r>
-              <a:rPr lang="en-US" smtClean="0"/>
+              <a:rPr lang="en-US"/>
               <a:t>Fourth level</a:t>
             </a:r>
           </a:p>
           <a:p>
             <a:pPr lvl="4"/>
             <a:r>
-              <a:rPr lang="en-US" smtClean="0"/>
+              <a:rPr lang="en-US"/>
               <a:t>Fifth level</a:t>
             </a:r>
             <a:endParaRPr lang="en-US" dirty="0"/>
@@ -1584,35 +1582,35 @@
           <a:p>
             <a:pPr lvl="0"/>
             <a:r>
-              <a:rPr lang="en-US" smtClean="0"/>
+              <a:rPr lang="en-US"/>
               <a:t>Edit Master text styles</a:t>
             </a:r>
           </a:p>
           <a:p>
             <a:pPr lvl="1"/>
             <a:r>
-              <a:rPr lang="en-US" smtClean="0"/>
+              <a:rPr lang="en-US"/>
               <a:t>Second level</a:t>
             </a:r>
           </a:p>
           <a:p>
             <a:pPr lvl="2"/>
             <a:r>
-              <a:rPr lang="en-US" smtClean="0"/>
+              <a:rPr lang="en-US"/>
               <a:t>Third level</a:t>
             </a:r>
           </a:p>
           <a:p>
             <a:pPr lvl="3"/>
             <a:r>
-              <a:rPr lang="en-US" smtClean="0"/>
+              <a:rPr lang="en-US"/>
               <a:t>Fourth level</a:t>
             </a:r>
           </a:p>
           <a:p>
             <a:pPr lvl="4"/>
             <a:r>
-              <a:rPr lang="en-US" smtClean="0"/>
+              <a:rPr lang="en-US"/>
               <a:t>Fifth level</a:t>
             </a:r>
             <a:endParaRPr lang="en-US" dirty="0"/>
@@ -1636,7 +1634,7 @@
           <a:p>
             <a:fld id="{FCC48F40-D526-46B5-AAE0-C515735D5BAE}" type="datetimeFigureOut">
               <a:rPr lang="en-US" smtClean="0"/>
-              <a:t>13-12-2016</a:t>
+              <a:t>2/5/2017</a:t>
             </a:fld>
             <a:endParaRPr lang="en-US"/>
           </a:p>
@@ -1735,7 +1733,7 @@
           <a:lstStyle/>
           <a:p>
             <a:r>
-              <a:rPr lang="en-US" smtClean="0"/>
+              <a:rPr lang="en-US"/>
               <a:t>Click to edit Master title style</a:t>
             </a:r>
             <a:endParaRPr lang="en-US" dirty="0"/>
@@ -1807,7 +1805,7 @@
           <a:p>
             <a:pPr lvl="0"/>
             <a:r>
-              <a:rPr lang="en-US" smtClean="0"/>
+              <a:rPr lang="en-US"/>
               <a:t>Edit Master text styles</a:t>
             </a:r>
           </a:p>
@@ -1835,35 +1833,35 @@
           <a:p>
             <a:pPr lvl="0"/>
             <a:r>
-              <a:rPr lang="en-US" smtClean="0"/>
+              <a:rPr lang="en-US"/>
               <a:t>Edit Master text styles</a:t>
             </a:r>
           </a:p>
           <a:p>
             <a:pPr lvl="1"/>
             <a:r>
-              <a:rPr lang="en-US" smtClean="0"/>
+              <a:rPr lang="en-US"/>
               <a:t>Second level</a:t>
             </a:r>
           </a:p>
           <a:p>
             <a:pPr lvl="2"/>
             <a:r>
-              <a:rPr lang="en-US" smtClean="0"/>
+              <a:rPr lang="en-US"/>
               <a:t>Third level</a:t>
             </a:r>
           </a:p>
           <a:p>
             <a:pPr lvl="3"/>
             <a:r>
-              <a:rPr lang="en-US" smtClean="0"/>
+              <a:rPr lang="en-US"/>
               <a:t>Fourth level</a:t>
             </a:r>
           </a:p>
           <a:p>
             <a:pPr lvl="4"/>
             <a:r>
-              <a:rPr lang="en-US" smtClean="0"/>
+              <a:rPr lang="en-US"/>
               <a:t>Fifth level</a:t>
             </a:r>
             <a:endParaRPr lang="en-US" dirty="0"/>
@@ -1935,7 +1933,7 @@
           <a:p>
             <a:pPr lvl="0"/>
             <a:r>
-              <a:rPr lang="en-US" smtClean="0"/>
+              <a:rPr lang="en-US"/>
               <a:t>Edit Master text styles</a:t>
             </a:r>
           </a:p>
@@ -1963,35 +1961,35 @@
           <a:p>
             <a:pPr lvl="0"/>
             <a:r>
-              <a:rPr lang="en-US" smtClean="0"/>
+              <a:rPr lang="en-US"/>
               <a:t>Edit Master text styles</a:t>
             </a:r>
           </a:p>
           <a:p>
             <a:pPr lvl="1"/>
             <a:r>
-              <a:rPr lang="en-US" smtClean="0"/>
+              <a:rPr lang="en-US"/>
               <a:t>Second level</a:t>
             </a:r>
           </a:p>
           <a:p>
             <a:pPr lvl="2"/>
             <a:r>
-              <a:rPr lang="en-US" smtClean="0"/>
+              <a:rPr lang="en-US"/>
               <a:t>Third level</a:t>
             </a:r>
           </a:p>
           <a:p>
             <a:pPr lvl="3"/>
             <a:r>
-              <a:rPr lang="en-US" smtClean="0"/>
+              <a:rPr lang="en-US"/>
               <a:t>Fourth level</a:t>
             </a:r>
           </a:p>
           <a:p>
             <a:pPr lvl="4"/>
             <a:r>
-              <a:rPr lang="en-US" smtClean="0"/>
+              <a:rPr lang="en-US"/>
               <a:t>Fifth level</a:t>
             </a:r>
             <a:endParaRPr lang="en-US" dirty="0"/>
@@ -2015,7 +2013,7 @@
           <a:p>
             <a:fld id="{FCC48F40-D526-46B5-AAE0-C515735D5BAE}" type="datetimeFigureOut">
               <a:rPr lang="en-US" smtClean="0"/>
-              <a:t>13-12-2016</a:t>
+              <a:t>2/5/2017</a:t>
             </a:fld>
             <a:endParaRPr lang="en-US"/>
           </a:p>
@@ -2109,7 +2107,7 @@
           <a:lstStyle/>
           <a:p>
             <a:r>
-              <a:rPr lang="en-US" smtClean="0"/>
+              <a:rPr lang="en-US"/>
               <a:t>Click to edit Master title style</a:t>
             </a:r>
             <a:endParaRPr lang="en-US" dirty="0"/>
@@ -2133,7 +2131,7 @@
           <a:p>
             <a:fld id="{FCC48F40-D526-46B5-AAE0-C515735D5BAE}" type="datetimeFigureOut">
               <a:rPr lang="en-US" smtClean="0"/>
-              <a:t>13-12-2016</a:t>
+              <a:t>2/5/2017</a:t>
             </a:fld>
             <a:endParaRPr lang="en-US"/>
           </a:p>
@@ -2304,7 +2302,7 @@
           <a:p>
             <a:fld id="{FCC48F40-D526-46B5-AAE0-C515735D5BAE}" type="datetimeFigureOut">
               <a:rPr lang="en-US" smtClean="0"/>
-              <a:t>13-12-2016</a:t>
+              <a:t>2/5/2017</a:t>
             </a:fld>
             <a:endParaRPr lang="en-US"/>
           </a:p>
@@ -2497,7 +2495,7 @@
           </a:lstStyle>
           <a:p>
             <a:r>
-              <a:rPr lang="en-US" smtClean="0"/>
+              <a:rPr lang="en-US"/>
               <a:t>Click to edit Master title style</a:t>
             </a:r>
             <a:endParaRPr lang="en-US" dirty="0"/>
@@ -2526,35 +2524,35 @@
           <a:p>
             <a:pPr lvl="0"/>
             <a:r>
-              <a:rPr lang="en-US" smtClean="0"/>
+              <a:rPr lang="en-US"/>
               <a:t>Edit Master text styles</a:t>
             </a:r>
           </a:p>
           <a:p>
             <a:pPr lvl="1"/>
             <a:r>
-              <a:rPr lang="en-US" smtClean="0"/>
+              <a:rPr lang="en-US"/>
               <a:t>Second level</a:t>
             </a:r>
           </a:p>
           <a:p>
             <a:pPr lvl="2"/>
             <a:r>
-              <a:rPr lang="en-US" smtClean="0"/>
+              <a:rPr lang="en-US"/>
               <a:t>Third level</a:t>
             </a:r>
           </a:p>
           <a:p>
             <a:pPr lvl="3"/>
             <a:r>
-              <a:rPr lang="en-US" smtClean="0"/>
+              <a:rPr lang="en-US"/>
               <a:t>Fourth level</a:t>
             </a:r>
           </a:p>
           <a:p>
             <a:pPr lvl="4"/>
             <a:r>
-              <a:rPr lang="en-US" smtClean="0"/>
+              <a:rPr lang="en-US"/>
               <a:t>Fifth level</a:t>
             </a:r>
             <a:endParaRPr lang="en-US" dirty="0"/>
@@ -2626,7 +2624,7 @@
           <a:p>
             <a:pPr lvl="0"/>
             <a:r>
-              <a:rPr lang="en-US" smtClean="0"/>
+              <a:rPr lang="en-US"/>
               <a:t>Edit Master text styles</a:t>
             </a:r>
           </a:p>
@@ -2658,7 +2656,7 @@
           <a:p>
             <a:fld id="{FCC48F40-D526-46B5-AAE0-C515735D5BAE}" type="datetimeFigureOut">
               <a:rPr lang="en-US" smtClean="0"/>
-              <a:t>13-12-2016</a:t>
+              <a:t>2/5/2017</a:t>
             </a:fld>
             <a:endParaRPr lang="en-US"/>
           </a:p>
@@ -2864,7 +2862,7 @@
           </a:lstStyle>
           <a:p>
             <a:r>
-              <a:rPr lang="en-US" smtClean="0"/>
+              <a:rPr lang="en-US"/>
               <a:t>Click to edit Master title style</a:t>
             </a:r>
             <a:endParaRPr lang="en-US" dirty="0"/>
@@ -2939,7 +2937,7 @@
           </a:lstStyle>
           <a:p>
             <a:r>
-              <a:rPr lang="en-US" smtClean="0"/>
+              <a:rPr lang="en-US"/>
               <a:t>Click icon to add picture</a:t>
             </a:r>
             <a:endParaRPr lang="en-US" dirty="0"/>
@@ -3017,7 +3015,7 @@
           <a:p>
             <a:pPr lvl="0"/>
             <a:r>
-              <a:rPr lang="en-US" smtClean="0"/>
+              <a:rPr lang="en-US"/>
               <a:t>Edit Master text styles</a:t>
             </a:r>
           </a:p>
@@ -3040,7 +3038,7 @@
           <a:p>
             <a:fld id="{FCC48F40-D526-46B5-AAE0-C515735D5BAE}" type="datetimeFigureOut">
               <a:rPr lang="en-US" smtClean="0"/>
-              <a:t>13-12-2016</a:t>
+              <a:t>2/5/2017</a:t>
             </a:fld>
             <a:endParaRPr lang="en-US"/>
           </a:p>
@@ -3225,7 +3223,7 @@
           <a:lstStyle/>
           <a:p>
             <a:r>
-              <a:rPr lang="en-US" smtClean="0"/>
+              <a:rPr lang="en-US"/>
               <a:t>Click to edit Master title style</a:t>
             </a:r>
             <a:endParaRPr lang="en-US" dirty="0"/>
@@ -3259,35 +3257,35 @@
           <a:p>
             <a:pPr lvl="0"/>
             <a:r>
-              <a:rPr lang="en-US" smtClean="0"/>
+              <a:rPr lang="en-US"/>
               <a:t>Edit Master text styles</a:t>
             </a:r>
           </a:p>
           <a:p>
             <a:pPr lvl="1"/>
             <a:r>
-              <a:rPr lang="en-US" smtClean="0"/>
+              <a:rPr lang="en-US"/>
               <a:t>Second level</a:t>
             </a:r>
           </a:p>
           <a:p>
             <a:pPr lvl="2"/>
             <a:r>
-              <a:rPr lang="en-US" smtClean="0"/>
+              <a:rPr lang="en-US"/>
               <a:t>Third level</a:t>
             </a:r>
           </a:p>
           <a:p>
             <a:pPr lvl="3"/>
             <a:r>
-              <a:rPr lang="en-US" smtClean="0"/>
+              <a:rPr lang="en-US"/>
               <a:t>Fourth level</a:t>
             </a:r>
           </a:p>
           <a:p>
             <a:pPr lvl="4"/>
             <a:r>
-              <a:rPr lang="en-US" smtClean="0"/>
+              <a:rPr lang="en-US"/>
               <a:t>Fifth level</a:t>
             </a:r>
             <a:endParaRPr lang="en-US" dirty="0"/>
@@ -3327,7 +3325,7 @@
           <a:p>
             <a:fld id="{FCC48F40-D526-46B5-AAE0-C515735D5BAE}" type="datetimeFigureOut">
               <a:rPr lang="en-US" smtClean="0"/>
-              <a:t>13-12-2016</a:t>
+              <a:t>2/5/2017</a:t>
             </a:fld>
             <a:endParaRPr lang="en-US"/>
           </a:p>
@@ -3867,10 +3865,9 @@
           <a:lstStyle/>
           <a:p>
             <a:r>
-              <a:rPr lang="en-US" dirty="0" smtClean="0"/>
+              <a:rPr lang="en-US" dirty="0"/>
               <a:t>Design</a:t>
             </a:r>
-            <a:endParaRPr lang="en-US" dirty="0"/>
           </a:p>
         </p:txBody>
       </p:sp>
@@ -3890,21 +3887,20 @@
           <a:lstStyle/>
           <a:p>
             <a:r>
-              <a:rPr lang="en-US" dirty="0" smtClean="0"/>
+              <a:rPr lang="en-US" dirty="0"/>
               <a:t>Sami </a:t>
             </a:r>
             <a:r>
-              <a:rPr lang="en-US" dirty="0" err="1" smtClean="0"/>
+              <a:rPr lang="en-US" dirty="0" err="1"/>
               <a:t>alfattani</a:t>
             </a:r>
-            <a:endParaRPr lang="en-US" dirty="0" smtClean="0"/>
-          </a:p>
-          <a:p>
-            <a:r>
-              <a:rPr lang="en-US" dirty="0" smtClean="0"/>
+            <a:endParaRPr lang="en-US" dirty="0"/>
+          </a:p>
+          <a:p>
+            <a:r>
+              <a:rPr lang="en-US" dirty="0"/>
               <a:t>20-06-2016</a:t>
             </a:r>
-            <a:endParaRPr lang="en-US" dirty="0"/>
           </a:p>
         </p:txBody>
       </p:sp>
@@ -3938,255 +3934,246 @@
           <a:chExt cx="0" cy="0"/>
         </a:xfrm>
       </p:grpSpPr>
-      <p:pic>
-        <p:nvPicPr>
-          <p:cNvPr id="2" name="Picture 1"/>
-          <p:cNvPicPr>
-            <a:picLocks noChangeAspect="1"/>
-          </p:cNvPicPr>
-          <p:nvPr/>
-        </p:nvPicPr>
-        <p:blipFill>
-          <a:blip r:embed="rId2"/>
-          <a:stretch>
-            <a:fillRect/>
-          </a:stretch>
-        </p:blipFill>
-        <p:spPr>
+      <p:grpSp>
+        <p:nvGrpSpPr>
+          <p:cNvPr id="6" name="Group 5"/>
+          <p:cNvGrpSpPr/>
+          <p:nvPr/>
+        </p:nvGrpSpPr>
+        <p:grpSpPr>
           <a:xfrm>
             <a:off x="2084058" y="969093"/>
             <a:ext cx="7634977" cy="3206981"/>
-          </a:xfrm>
-          <a:prstGeom prst="rect">
-            <a:avLst/>
-          </a:prstGeom>
-        </p:spPr>
-      </p:pic>
-      <p:pic>
-        <p:nvPicPr>
-          <p:cNvPr id="3" name="Picture 2"/>
-          <p:cNvPicPr>
-            <a:picLocks noChangeAspect="1"/>
-          </p:cNvPicPr>
-          <p:nvPr/>
-        </p:nvPicPr>
-        <p:blipFill>
-          <a:blip r:embed="rId3">
-            <a:extLst>
-              <a:ext uri="{28A0092B-C50C-407E-A947-70E740481C1C}">
-                <a14:useLocalDpi xmlns:a14="http://schemas.microsoft.com/office/drawing/2010/main" val="0"/>
-              </a:ext>
-            </a:extLst>
-          </a:blip>
-          <a:stretch>
-            <a:fillRect/>
-          </a:stretch>
-        </p:blipFill>
-        <p:spPr>
-          <a:xfrm>
-            <a:off x="2829211" y="1326617"/>
-            <a:ext cx="1176417" cy="1176417"/>
-          </a:xfrm>
-          <a:prstGeom prst="rect">
-            <a:avLst/>
-          </a:prstGeom>
-        </p:spPr>
-      </p:pic>
-      <p:sp>
-        <p:nvSpPr>
-          <p:cNvPr id="4" name="TextBox 3"/>
-          <p:cNvSpPr txBox="1"/>
-          <p:nvPr/>
-        </p:nvSpPr>
-        <p:spPr>
-          <a:xfrm>
-            <a:off x="2187756" y="2622802"/>
-            <a:ext cx="2459328" cy="1077218"/>
-          </a:xfrm>
-          <a:prstGeom prst="rect">
-            <a:avLst/>
-          </a:prstGeom>
-          <a:noFill/>
-        </p:spPr>
-        <p:txBody>
-          <a:bodyPr wrap="none" rtlCol="0">
-            <a:spAutoFit/>
-          </a:bodyPr>
-          <a:lstStyle/>
-          <a:p>
-            <a:pPr algn="ctr"/>
-            <a:r>
-              <a:rPr lang="en-US" sz="3200" dirty="0" smtClean="0">
-                <a:solidFill>
-                  <a:srgbClr val="3366FF"/>
-                </a:solidFill>
-                <a:latin typeface="Cooper Black" panose="0208090404030B020404" pitchFamily="18" charset="0"/>
-              </a:rPr>
-              <a:t>E-Quiz</a:t>
-            </a:r>
-          </a:p>
-          <a:p>
-            <a:r>
-              <a:rPr lang="en-US" sz="3200" dirty="0" smtClean="0">
-                <a:solidFill>
-                  <a:srgbClr val="3366FF"/>
-                </a:solidFill>
-                <a:latin typeface="Cooper Black" panose="0208090404030B020404" pitchFamily="18" charset="0"/>
-              </a:rPr>
-              <a:t>Client Side</a:t>
-            </a:r>
-            <a:endParaRPr lang="en-US" sz="3200" dirty="0">
-              <a:solidFill>
-                <a:srgbClr val="3366FF"/>
-              </a:solidFill>
-              <a:latin typeface="Cooper Black" panose="0208090404030B020404" pitchFamily="18" charset="0"/>
-            </a:endParaRPr>
-          </a:p>
-        </p:txBody>
-      </p:sp>
-      <p:sp>
-        <p:nvSpPr>
-          <p:cNvPr id="5" name="TextBox 4"/>
-          <p:cNvSpPr txBox="1"/>
-          <p:nvPr/>
-        </p:nvSpPr>
-        <p:spPr>
-          <a:xfrm>
-            <a:off x="4719675" y="1326617"/>
-            <a:ext cx="4751622" cy="2554545"/>
-          </a:xfrm>
-          <a:prstGeom prst="rect">
-            <a:avLst/>
-          </a:prstGeom>
-          <a:noFill/>
-        </p:spPr>
-        <p:txBody>
-          <a:bodyPr wrap="none" rtlCol="0">
-            <a:spAutoFit/>
-          </a:bodyPr>
-          <a:lstStyle/>
-          <a:p>
-            <a:r>
-              <a:rPr lang="en-US" sz="1600" b="1" dirty="0" smtClean="0">
+            <a:chOff x="2084058" y="969093"/>
+            <a:chExt cx="7634977" cy="3206981"/>
+          </a:xfrm>
+        </p:grpSpPr>
+        <p:pic>
+          <p:nvPicPr>
+            <p:cNvPr id="2" name="Picture 1"/>
+            <p:cNvPicPr>
+              <a:picLocks noChangeAspect="1"/>
+            </p:cNvPicPr>
+            <p:nvPr/>
+          </p:nvPicPr>
+          <p:blipFill>
+            <a:blip r:embed="rId2"/>
+            <a:stretch>
+              <a:fillRect/>
+            </a:stretch>
+          </p:blipFill>
+          <p:spPr>
+            <a:xfrm>
+              <a:off x="2084058" y="969093"/>
+              <a:ext cx="7634977" cy="3206981"/>
+            </a:xfrm>
+            <a:prstGeom prst="rect">
+              <a:avLst/>
+            </a:prstGeom>
+          </p:spPr>
+        </p:pic>
+        <p:pic>
+          <p:nvPicPr>
+            <p:cNvPr id="3" name="Picture 2"/>
+            <p:cNvPicPr>
+              <a:picLocks noChangeAspect="1"/>
+            </p:cNvPicPr>
+            <p:nvPr/>
+          </p:nvPicPr>
+          <p:blipFill>
+            <a:blip r:embed="rId3">
+              <a:extLst>
+                <a:ext uri="{28A0092B-C50C-407E-A947-70E740481C1C}">
+                  <a14:useLocalDpi xmlns:a14="http://schemas.microsoft.com/office/drawing/2010/main" val="0"/>
+                </a:ext>
+              </a:extLst>
+            </a:blip>
+            <a:stretch>
+              <a:fillRect/>
+            </a:stretch>
+          </p:blipFill>
+          <p:spPr>
+            <a:xfrm>
+              <a:off x="2829211" y="1326617"/>
+              <a:ext cx="1176417" cy="1176417"/>
+            </a:xfrm>
+            <a:prstGeom prst="rect">
+              <a:avLst/>
+            </a:prstGeom>
+          </p:spPr>
+        </p:pic>
+        <p:sp>
+          <p:nvSpPr>
+            <p:cNvPr id="4" name="TextBox 3"/>
+            <p:cNvSpPr txBox="1"/>
+            <p:nvPr/>
+          </p:nvSpPr>
+          <p:spPr>
+            <a:xfrm>
+              <a:off x="2130658" y="2622802"/>
+              <a:ext cx="2573525" cy="1077218"/>
+            </a:xfrm>
+            <a:prstGeom prst="rect">
+              <a:avLst/>
+            </a:prstGeom>
+            <a:noFill/>
+          </p:spPr>
+          <p:txBody>
+            <a:bodyPr wrap="none" rtlCol="0">
+              <a:spAutoFit/>
+            </a:bodyPr>
+            <a:lstStyle/>
+            <a:p>
+              <a:pPr algn="ctr"/>
+              <a:r>
+                <a:rPr lang="en-US" sz="3200" dirty="0">
+                  <a:solidFill>
+                    <a:srgbClr val="3366FF"/>
+                  </a:solidFill>
+                  <a:latin typeface="Cooper Black" panose="0208090404030B020404" pitchFamily="18" charset="0"/>
+                </a:rPr>
+                <a:t>E-Quiz</a:t>
+              </a:r>
+            </a:p>
+            <a:p>
+              <a:r>
+                <a:rPr lang="en-US" sz="3200" dirty="0">
+                  <a:solidFill>
+                    <a:srgbClr val="3366FF"/>
+                  </a:solidFill>
+                  <a:latin typeface="Cooper Black" panose="0208090404030B020404" pitchFamily="18" charset="0"/>
+                </a:rPr>
+                <a:t>Server Side</a:t>
+              </a:r>
+            </a:p>
+          </p:txBody>
+        </p:sp>
+        <p:sp>
+          <p:nvSpPr>
+            <p:cNvPr id="5" name="TextBox 4"/>
+            <p:cNvSpPr txBox="1"/>
+            <p:nvPr/>
+          </p:nvSpPr>
+          <p:spPr>
+            <a:xfrm>
+              <a:off x="4719676" y="1326617"/>
+              <a:ext cx="4853532" cy="2800767"/>
+            </a:xfrm>
+            <a:prstGeom prst="rect">
+              <a:avLst/>
+            </a:prstGeom>
+            <a:noFill/>
+          </p:spPr>
+          <p:txBody>
+            <a:bodyPr wrap="square" rtlCol="0">
+              <a:spAutoFit/>
+            </a:bodyPr>
+            <a:lstStyle/>
+            <a:p>
+              <a:r>
+                <a:rPr lang="en-US" sz="1600" b="1" dirty="0">
+                  <a:latin typeface="Courier New" panose="02070309020205020404" pitchFamily="49" charset="0"/>
+                  <a:cs typeface="Courier New" panose="02070309020205020404" pitchFamily="49" charset="0"/>
+                </a:rPr>
+                <a:t>Version: 2.3.1.50</a:t>
+              </a:r>
+            </a:p>
+            <a:p>
+              <a:r>
+                <a:rPr lang="en-US" sz="1600" b="1" dirty="0">
+                  <a:latin typeface="Courier New" panose="02070309020205020404" pitchFamily="49" charset="0"/>
+                  <a:cs typeface="Courier New" panose="02070309020205020404" pitchFamily="49" charset="0"/>
+                </a:rPr>
+                <a:t>Release: 5 January 2017</a:t>
+              </a:r>
+            </a:p>
+            <a:p>
+              <a:r>
+                <a:rPr lang="en-US" sz="1600" b="1" dirty="0">
+                  <a:latin typeface="Courier New" panose="02070309020205020404" pitchFamily="49" charset="0"/>
+                  <a:cs typeface="Courier New" panose="02070309020205020404" pitchFamily="49" charset="0"/>
+                </a:rPr>
+                <a:t>License: Freeware</a:t>
+              </a:r>
+            </a:p>
+            <a:p>
+              <a:endParaRPr lang="en-US" sz="1600" b="1" dirty="0">
                 <a:latin typeface="Courier New" panose="02070309020205020404" pitchFamily="49" charset="0"/>
                 <a:cs typeface="Courier New" panose="02070309020205020404" pitchFamily="49" charset="0"/>
-              </a:rPr>
-              <a:t>Version</a:t>
-            </a:r>
-            <a:r>
-              <a:rPr lang="en-US" sz="1600" b="1" dirty="0">
+              </a:endParaRPr>
+            </a:p>
+            <a:p>
+              <a:endParaRPr lang="en-US" sz="1600" b="1" dirty="0">
                 <a:latin typeface="Courier New" panose="02070309020205020404" pitchFamily="49" charset="0"/>
                 <a:cs typeface="Courier New" panose="02070309020205020404" pitchFamily="49" charset="0"/>
-              </a:rPr>
-              <a:t>: </a:t>
-            </a:r>
-            <a:r>
-              <a:rPr lang="en-US" sz="1600" b="1" dirty="0" smtClean="0">
+              </a:endParaRPr>
+            </a:p>
+            <a:p>
+              <a:r>
+                <a:rPr lang="en-US" sz="1600" b="1" dirty="0">
+                  <a:latin typeface="Courier New" panose="02070309020205020404" pitchFamily="49" charset="0"/>
+                  <a:cs typeface="Courier New" panose="02070309020205020404" pitchFamily="49" charset="0"/>
+                </a:rPr>
+                <a:t>All copy rights are received (c) 2016-2017.</a:t>
+              </a:r>
+            </a:p>
+            <a:p>
+              <a:endParaRPr lang="en-US" sz="1600" b="1" dirty="0">
                 <a:latin typeface="Courier New" panose="02070309020205020404" pitchFamily="49" charset="0"/>
                 <a:cs typeface="Courier New" panose="02070309020205020404" pitchFamily="49" charset="0"/>
-              </a:rPr>
-              <a:t>2.2.0.50</a:t>
-            </a:r>
-          </a:p>
-          <a:p>
-            <a:r>
-              <a:rPr lang="en-US" sz="1600" b="1" dirty="0" smtClean="0">
+              </a:endParaRPr>
+            </a:p>
+            <a:p>
+              <a:r>
+                <a:rPr lang="en-US" sz="1600" b="1" dirty="0">
+                  <a:latin typeface="Courier New" panose="02070309020205020404" pitchFamily="49" charset="0"/>
+                  <a:cs typeface="Courier New" panose="02070309020205020404" pitchFamily="49" charset="0"/>
+                </a:rPr>
+                <a:t>Programmed by: Eng. Sami A. </a:t>
+              </a:r>
+              <a:r>
+                <a:rPr lang="en-US" sz="1600" b="1" dirty="0" err="1">
+                  <a:latin typeface="Courier New" panose="02070309020205020404" pitchFamily="49" charset="0"/>
+                  <a:cs typeface="Courier New" panose="02070309020205020404" pitchFamily="49" charset="0"/>
+                </a:rPr>
+                <a:t>Alfattani</a:t>
+              </a:r>
+              <a:endParaRPr lang="en-US" sz="1600" b="1" dirty="0">
                 <a:latin typeface="Courier New" panose="02070309020205020404" pitchFamily="49" charset="0"/>
                 <a:cs typeface="Courier New" panose="02070309020205020404" pitchFamily="49" charset="0"/>
-              </a:rPr>
-              <a:t>Release: 31 October 2016</a:t>
-            </a:r>
-          </a:p>
-          <a:p>
-            <a:r>
-              <a:rPr lang="en-US" sz="1600" b="1" dirty="0" smtClean="0">
-                <a:latin typeface="Courier New" panose="02070309020205020404" pitchFamily="49" charset="0"/>
-                <a:cs typeface="Courier New" panose="02070309020205020404" pitchFamily="49" charset="0"/>
-              </a:rPr>
-              <a:t>License: Freeware</a:t>
-            </a:r>
-          </a:p>
-          <a:p>
-            <a:endParaRPr lang="en-US" sz="1600" b="1" dirty="0" smtClean="0">
-              <a:latin typeface="Courier New" panose="02070309020205020404" pitchFamily="49" charset="0"/>
-              <a:cs typeface="Courier New" panose="02070309020205020404" pitchFamily="49" charset="0"/>
-            </a:endParaRPr>
-          </a:p>
-          <a:p>
-            <a:endParaRPr lang="en-US" sz="1600" b="1" dirty="0">
-              <a:latin typeface="Courier New" panose="02070309020205020404" pitchFamily="49" charset="0"/>
-              <a:cs typeface="Courier New" panose="02070309020205020404" pitchFamily="49" charset="0"/>
-            </a:endParaRPr>
-          </a:p>
-          <a:p>
-            <a:r>
-              <a:rPr lang="en-US" sz="1600" b="1" dirty="0" smtClean="0">
-                <a:latin typeface="Courier New" panose="02070309020205020404" pitchFamily="49" charset="0"/>
-                <a:cs typeface="Courier New" panose="02070309020205020404" pitchFamily="49" charset="0"/>
-              </a:rPr>
-              <a:t>All copy right are received (c) 2016.</a:t>
-            </a:r>
-          </a:p>
-          <a:p>
-            <a:endParaRPr lang="en-US" sz="1600" b="1" dirty="0">
-              <a:latin typeface="Courier New" panose="02070309020205020404" pitchFamily="49" charset="0"/>
-              <a:cs typeface="Courier New" panose="02070309020205020404" pitchFamily="49" charset="0"/>
-            </a:endParaRPr>
-          </a:p>
-          <a:p>
-            <a:r>
-              <a:rPr lang="en-US" sz="1600" b="1" dirty="0" smtClean="0">
-                <a:latin typeface="Courier New" panose="02070309020205020404" pitchFamily="49" charset="0"/>
-                <a:cs typeface="Courier New" panose="02070309020205020404" pitchFamily="49" charset="0"/>
-              </a:rPr>
-              <a:t>Programmed by: Eng. Sami A. </a:t>
-            </a:r>
-            <a:r>
-              <a:rPr lang="en-US" sz="1600" b="1" dirty="0" err="1" smtClean="0">
-                <a:latin typeface="Courier New" panose="02070309020205020404" pitchFamily="49" charset="0"/>
-                <a:cs typeface="Courier New" panose="02070309020205020404" pitchFamily="49" charset="0"/>
-              </a:rPr>
-              <a:t>Alfattani</a:t>
-            </a:r>
-            <a:endParaRPr lang="en-US" sz="1600" b="1" dirty="0" smtClean="0">
-              <a:latin typeface="Courier New" panose="02070309020205020404" pitchFamily="49" charset="0"/>
-              <a:cs typeface="Courier New" panose="02070309020205020404" pitchFamily="49" charset="0"/>
-            </a:endParaRPr>
-          </a:p>
-          <a:p>
-            <a:r>
-              <a:rPr lang="en-US" sz="1600" b="1" dirty="0" smtClean="0">
-                <a:latin typeface="Courier New" panose="02070309020205020404" pitchFamily="49" charset="0"/>
-                <a:cs typeface="Courier New" panose="02070309020205020404" pitchFamily="49" charset="0"/>
-              </a:rPr>
-              <a:t>Contact: </a:t>
-            </a:r>
-            <a:r>
-              <a:rPr lang="en-US" sz="1600" b="1" dirty="0" smtClean="0">
-                <a:solidFill>
-                  <a:srgbClr val="3366FF"/>
-                </a:solidFill>
-                <a:latin typeface="Courier New" panose="02070309020205020404" pitchFamily="49" charset="0"/>
-                <a:cs typeface="Courier New" panose="02070309020205020404" pitchFamily="49" charset="0"/>
-              </a:rPr>
-              <a:t>Sami_Alfattani@hotmail.com</a:t>
-            </a:r>
-          </a:p>
-          <a:p>
-            <a:r>
-              <a:rPr lang="en-US" sz="1600" b="1" dirty="0" smtClean="0">
-                <a:latin typeface="Courier New" panose="02070309020205020404" pitchFamily="49" charset="0"/>
-                <a:cs typeface="Courier New" panose="02070309020205020404" pitchFamily="49" charset="0"/>
-              </a:rPr>
-              <a:t>Mobile : +966-5-645-99127</a:t>
-            </a:r>
-            <a:endParaRPr lang="en-US" sz="1600" b="1" dirty="0">
-              <a:latin typeface="Courier New" panose="02070309020205020404" pitchFamily="49" charset="0"/>
-              <a:cs typeface="Courier New" panose="02070309020205020404" pitchFamily="49" charset="0"/>
-            </a:endParaRPr>
-          </a:p>
-        </p:txBody>
-      </p:sp>
+              </a:endParaRPr>
+            </a:p>
+            <a:p>
+              <a:r>
+                <a:rPr lang="en-US" sz="1600" b="1" dirty="0">
+                  <a:latin typeface="Courier New" panose="02070309020205020404" pitchFamily="49" charset="0"/>
+                  <a:cs typeface="Courier New" panose="02070309020205020404" pitchFamily="49" charset="0"/>
+                </a:rPr>
+                <a:t>Contact: </a:t>
+              </a:r>
+              <a:r>
+                <a:rPr lang="en-US" sz="1600" b="1" dirty="0">
+                  <a:solidFill>
+                    <a:srgbClr val="3366FF"/>
+                  </a:solidFill>
+                  <a:latin typeface="Courier New" panose="02070309020205020404" pitchFamily="49" charset="0"/>
+                  <a:cs typeface="Courier New" panose="02070309020205020404" pitchFamily="49" charset="0"/>
+                </a:rPr>
+                <a:t>Sami_Alfattani@hotmail.com</a:t>
+              </a:r>
+            </a:p>
+            <a:p>
+              <a:r>
+                <a:rPr lang="en-US" sz="1600" b="1" dirty="0">
+                  <a:latin typeface="Courier New" panose="02070309020205020404" pitchFamily="49" charset="0"/>
+                  <a:cs typeface="Courier New" panose="02070309020205020404" pitchFamily="49" charset="0"/>
+                </a:rPr>
+                <a:t>Mobile : +966-5-645-99127</a:t>
+              </a:r>
+            </a:p>
+          </p:txBody>
+        </p:sp>
+      </p:grpSp>
     </p:spTree>
     <p:extLst>
       <p:ext uri="{BB962C8B-B14F-4D97-AF65-F5344CB8AC3E}">
@@ -4233,10 +4220,9 @@
           <a:lstStyle/>
           <a:p>
             <a:r>
-              <a:rPr lang="en-US" dirty="0" smtClean="0"/>
+              <a:rPr lang="en-US" dirty="0"/>
               <a:t>ICONS</a:t>
             </a:r>
-            <a:endParaRPr lang="en-US" dirty="0"/>
           </a:p>
         </p:txBody>
       </p:sp>
@@ -4356,7 +4342,7 @@
           <a:lstStyle/>
           <a:p>
             <a:r>
-              <a:rPr lang="en-US" smtClean="0"/>
+              <a:rPr lang="en-US"/>
               <a:t>Start Exam</a:t>
             </a:r>
             <a:endParaRPr lang="en-US" dirty="0"/>
@@ -4446,7 +4432,7 @@
           <a:p>
             <a:pPr algn="ctr"/>
             <a:r>
-              <a:rPr lang="en-US" dirty="0" err="1" smtClean="0"/>
+              <a:rPr lang="en-US" dirty="0" err="1"/>
               <a:t>SendExam</a:t>
             </a:r>
             <a:endParaRPr lang="en-US" dirty="0"/>
@@ -4677,7 +4663,7 @@
           <a:p>
             <a:pPr algn="ctr"/>
             <a:r>
-              <a:rPr lang="en-US" b="1" i="1" dirty="0" smtClean="0"/>
+              <a:rPr lang="en-US" b="1" i="1" dirty="0"/>
               <a:t>IMAGES_LIST</a:t>
             </a:r>
             <a:endParaRPr lang="en-US" dirty="0"/>
@@ -4796,7 +4782,7 @@
           <a:p>
             <a:pPr algn="ctr"/>
             <a:r>
-              <a:rPr lang="en-US" dirty="0" err="1" smtClean="0"/>
+              <a:rPr lang="en-US" dirty="0" err="1"/>
               <a:t>getData</a:t>
             </a:r>
             <a:endParaRPr lang="en-US" dirty="0"/>
@@ -4838,7 +4824,7 @@
           <a:p>
             <a:pPr algn="ctr"/>
             <a:r>
-              <a:rPr lang="en-US" dirty="0" err="1" smtClean="0"/>
+              <a:rPr lang="en-US" dirty="0" err="1"/>
               <a:t>getData</a:t>
             </a:r>
             <a:endParaRPr lang="en-US" dirty="0"/>
@@ -4957,7 +4943,7 @@
           <a:p>
             <a:pPr algn="ctr"/>
             <a:r>
-              <a:rPr lang="en-US" b="1" dirty="0" err="1" smtClean="0"/>
+              <a:rPr lang="en-US" b="1" dirty="0" err="1"/>
               <a:t>RunExam</a:t>
             </a:r>
             <a:endParaRPr lang="en-US" b="1" dirty="0"/>
@@ -4999,7 +4985,7 @@
           <a:p>
             <a:pPr algn="ctr"/>
             <a:r>
-              <a:rPr lang="en-US" b="1" dirty="0" err="1" smtClean="0"/>
+              <a:rPr lang="en-US" b="1" dirty="0" err="1"/>
               <a:t>RunExam</a:t>
             </a:r>
             <a:endParaRPr lang="en-US" b="1" dirty="0"/>
@@ -5052,10 +5038,9 @@
           <a:lstStyle/>
           <a:p>
             <a:r>
-              <a:rPr lang="en-US" dirty="0" smtClean="0"/>
+              <a:rPr lang="en-US" dirty="0"/>
               <a:t>Finish and submit the exam.</a:t>
             </a:r>
-            <a:endParaRPr lang="en-US" dirty="0"/>
           </a:p>
         </p:txBody>
       </p:sp>
@@ -5264,7 +5249,7 @@
           <a:p>
             <a:pPr algn="ctr"/>
             <a:r>
-              <a:rPr lang="en-US" dirty="0" err="1" smtClean="0"/>
+              <a:rPr lang="en-US" dirty="0" err="1"/>
               <a:t>setExamSheet</a:t>
             </a:r>
             <a:endParaRPr lang="en-US" dirty="0"/>
@@ -5385,10 +5370,9 @@
           <a:p>
             <a:pPr algn="ctr"/>
             <a:r>
-              <a:rPr lang="en-US" dirty="0" smtClean="0"/>
+              <a:rPr lang="en-US" dirty="0"/>
               <a:t>Prompt “Submitted”</a:t>
             </a:r>
-            <a:endParaRPr lang="en-US" dirty="0"/>
           </a:p>
         </p:txBody>
       </p:sp>
@@ -5504,13 +5488,56 @@
           <a:p>
             <a:pPr algn="ctr"/>
             <a:r>
-              <a:rPr lang="en-US" dirty="0" err="1" smtClean="0"/>
+              <a:rPr lang="en-US" dirty="0" err="1"/>
               <a:t>SetStatus</a:t>
             </a:r>
             <a:r>
-              <a:rPr lang="en-US" dirty="0" smtClean="0"/>
+              <a:rPr lang="en-US" dirty="0"/>
               <a:t> (“Finished”)</a:t>
             </a:r>
+          </a:p>
+        </p:txBody>
+      </p:sp>
+      <p:sp>
+        <p:nvSpPr>
+          <p:cNvPr id="19" name="Flowchart: Summing Junction 18"/>
+          <p:cNvSpPr/>
+          <p:nvPr/>
+        </p:nvSpPr>
+        <p:spPr>
+          <a:xfrm>
+            <a:off x="2713069" y="3797854"/>
+            <a:ext cx="2631233" cy="1343608"/>
+          </a:xfrm>
+          <a:prstGeom prst="flowChartSummingJunction">
+            <a:avLst/>
+          </a:prstGeom>
+          <a:noFill/>
+          <a:ln>
+            <a:solidFill>
+              <a:srgbClr val="FF0000"/>
+            </a:solidFill>
+          </a:ln>
+        </p:spPr>
+        <p:style>
+          <a:lnRef idx="2">
+            <a:schemeClr val="accent1"/>
+          </a:lnRef>
+          <a:fillRef idx="1">
+            <a:schemeClr val="lt1"/>
+          </a:fillRef>
+          <a:effectRef idx="0">
+            <a:schemeClr val="accent1"/>
+          </a:effectRef>
+          <a:fontRef idx="minor">
+            <a:schemeClr val="dk1"/>
+          </a:fontRef>
+        </p:style>
+        <p:txBody>
+          <a:bodyPr rtlCol="0" anchor="ctr"/>
+          <a:lstStyle/>
+          <a:p>
+            <a:pPr algn="ctr"/>
             <a:endParaRPr lang="en-US" dirty="0"/>
           </a:p>
         </p:txBody>
@@ -5561,10 +5588,9 @@
           <a:lstStyle/>
           <a:p>
             <a:r>
-              <a:rPr lang="en-US" dirty="0" smtClean="0"/>
+              <a:rPr lang="en-US" dirty="0"/>
               <a:t>Terminate exam</a:t>
             </a:r>
-            <a:endParaRPr lang="en-US" dirty="0"/>
           </a:p>
         </p:txBody>
       </p:sp>
@@ -5971,10 +5997,9 @@
           <a:p>
             <a:pPr algn="ctr"/>
             <a:r>
-              <a:rPr lang="en-US" dirty="0" smtClean="0"/>
+              <a:rPr lang="en-US" dirty="0"/>
               <a:t>Prompt “Submitted”</a:t>
             </a:r>
-            <a:endParaRPr lang="en-US" dirty="0"/>
           </a:p>
         </p:txBody>
       </p:sp>
@@ -6090,13 +6115,56 @@
           <a:p>
             <a:pPr algn="ctr"/>
             <a:r>
-              <a:rPr lang="en-US" dirty="0" err="1" smtClean="0"/>
+              <a:rPr lang="en-US" dirty="0" err="1"/>
               <a:t>SetStatus</a:t>
             </a:r>
             <a:r>
-              <a:rPr lang="en-US" dirty="0" smtClean="0"/>
+              <a:rPr lang="en-US" dirty="0"/>
               <a:t> (“Finished”)</a:t>
             </a:r>
+          </a:p>
+        </p:txBody>
+      </p:sp>
+      <p:sp>
+        <p:nvSpPr>
+          <p:cNvPr id="17" name="Flowchart: Summing Junction 16"/>
+          <p:cNvSpPr/>
+          <p:nvPr/>
+        </p:nvSpPr>
+        <p:spPr>
+          <a:xfrm>
+            <a:off x="2376865" y="4471829"/>
+            <a:ext cx="2631233" cy="1343608"/>
+          </a:xfrm>
+          <a:prstGeom prst="flowChartSummingJunction">
+            <a:avLst/>
+          </a:prstGeom>
+          <a:noFill/>
+          <a:ln>
+            <a:solidFill>
+              <a:srgbClr val="FF0000"/>
+            </a:solidFill>
+          </a:ln>
+        </p:spPr>
+        <p:style>
+          <a:lnRef idx="2">
+            <a:schemeClr val="accent1"/>
+          </a:lnRef>
+          <a:fillRef idx="1">
+            <a:schemeClr val="lt1"/>
+          </a:fillRef>
+          <a:effectRef idx="0">
+            <a:schemeClr val="accent1"/>
+          </a:effectRef>
+          <a:fontRef idx="minor">
+            <a:schemeClr val="dk1"/>
+          </a:fontRef>
+        </p:style>
+        <p:txBody>
+          <a:bodyPr rtlCol="0" anchor="ctr"/>
+          <a:lstStyle/>
+          <a:p>
+            <a:pPr algn="ctr"/>
             <a:endParaRPr lang="en-US" dirty="0"/>
           </a:p>
         </p:txBody>
@@ -6147,10 +6215,9 @@
           <a:lstStyle/>
           <a:p>
             <a:r>
-              <a:rPr lang="en-US" dirty="0" smtClean="0"/>
+              <a:rPr lang="en-US" dirty="0"/>
               <a:t>Backup All</a:t>
             </a:r>
-            <a:endParaRPr lang="en-US" dirty="0"/>
           </a:p>
         </p:txBody>
       </p:sp>
@@ -6236,22 +6303,22 @@
           <a:lstStyle/>
           <a:p>
             <a:r>
-              <a:rPr lang="en-US" dirty="0" smtClean="0"/>
+              <a:rPr lang="en-US" dirty="0"/>
               <a:t>Find Started and </a:t>
             </a:r>
             <a:r>
-              <a:rPr lang="en-US" dirty="0" err="1" smtClean="0"/>
+              <a:rPr lang="en-US" dirty="0" err="1"/>
               <a:t>Rsumed</a:t>
             </a:r>
-            <a:endParaRPr lang="en-US" dirty="0" smtClean="0"/>
-          </a:p>
-          <a:p>
-            <a:r>
-              <a:rPr lang="en-US" dirty="0" err="1" smtClean="0"/>
+            <a:endParaRPr lang="en-US" dirty="0"/>
+          </a:p>
+          <a:p>
+            <a:r>
+              <a:rPr lang="en-US" dirty="0" err="1"/>
               <a:t>CounterBackup</a:t>
             </a:r>
             <a:r>
-              <a:rPr lang="en-US" dirty="0" smtClean="0"/>
+              <a:rPr lang="en-US" dirty="0"/>
               <a:t>++</a:t>
             </a:r>
           </a:p>
@@ -6624,29 +6691,29 @@
           <a:lstStyle/>
           <a:p>
             <a:r>
-              <a:rPr lang="en-US" dirty="0" err="1" smtClean="0"/>
+              <a:rPr lang="en-US" dirty="0" err="1"/>
               <a:t>UpdateExamSheet</a:t>
             </a:r>
-            <a:endParaRPr lang="en-US" dirty="0" smtClean="0"/>
-          </a:p>
-          <a:p>
-            <a:r>
-              <a:rPr lang="en-US" dirty="0" smtClean="0"/>
+            <a:endParaRPr lang="en-US" dirty="0"/>
+          </a:p>
+          <a:p>
+            <a:r>
+              <a:rPr lang="en-US" dirty="0"/>
               <a:t>Find Started and </a:t>
             </a:r>
             <a:r>
-              <a:rPr lang="en-US" dirty="0" err="1" smtClean="0"/>
+              <a:rPr lang="en-US" dirty="0" err="1"/>
               <a:t>Rsumed</a:t>
             </a:r>
-            <a:endParaRPr lang="en-US" dirty="0" smtClean="0"/>
-          </a:p>
-          <a:p>
-            <a:r>
-              <a:rPr lang="en-US" dirty="0" err="1" smtClean="0"/>
+            <a:endParaRPr lang="en-US" dirty="0"/>
+          </a:p>
+          <a:p>
+            <a:r>
+              <a:rPr lang="en-US" dirty="0" err="1"/>
               <a:t>CounterBackup</a:t>
             </a:r>
             <a:r>
-              <a:rPr lang="en-US" dirty="0" smtClean="0"/>
+              <a:rPr lang="en-US" dirty="0"/>
               <a:t>++</a:t>
             </a:r>
           </a:p>
@@ -6700,7 +6767,7 @@
         <p:spPr>
           <a:xfrm>
             <a:off x="2041156" y="1142383"/>
-            <a:ext cx="1346779" cy="369332"/>
+            <a:ext cx="3959674" cy="369332"/>
           </a:xfrm>
           <a:prstGeom prst="rect">
             <a:avLst/>
@@ -6714,10 +6781,9 @@
           <a:lstStyle/>
           <a:p>
             <a:r>
-              <a:rPr lang="en-US" dirty="0" smtClean="0"/>
-              <a:t>Every 2 Min.</a:t>
-            </a:r>
-            <a:endParaRPr lang="en-US" dirty="0"/>
+              <a:rPr lang="en-US" dirty="0"/>
+              <a:t>Every 5 Min. (Don’t put less than 5 min.)</a:t>
+            </a:r>
           </a:p>
         </p:txBody>
       </p:sp>
@@ -6744,7 +6810,7 @@
           <a:lstStyle/>
           <a:p>
             <a:r>
-              <a:rPr lang="en-US" sz="3200" b="1" dirty="0" smtClean="0"/>
+              <a:rPr lang="en-US" sz="3200" b="1" dirty="0"/>
               <a:t>:</a:t>
             </a:r>
           </a:p>
@@ -6791,26 +6857,22 @@
           <a:p>
             <a:r>
               <a:rPr lang="en-US" dirty="0"/>
-              <a:t>If </a:t>
-            </a:r>
-            <a:r>
-              <a:rPr lang="en-US" dirty="0" smtClean="0"/>
-              <a:t>(</a:t>
-            </a:r>
-            <a:r>
-              <a:rPr lang="en-US" dirty="0" err="1" smtClean="0"/>
+              <a:t>If (</a:t>
+            </a:r>
+            <a:r>
+              <a:rPr lang="en-US" dirty="0" err="1"/>
               <a:t>CounterBackup</a:t>
             </a:r>
             <a:r>
-              <a:rPr lang="en-US" dirty="0" smtClean="0"/>
+              <a:rPr lang="en-US" dirty="0"/>
               <a:t> == </a:t>
             </a:r>
             <a:r>
-              <a:rPr lang="en-US" dirty="0" err="1" smtClean="0"/>
+              <a:rPr lang="en-US" dirty="0" err="1"/>
               <a:t>lastIndex</a:t>
             </a:r>
             <a:r>
-              <a:rPr lang="en-US" dirty="0" smtClean="0"/>
+              <a:rPr lang="en-US" dirty="0"/>
               <a:t>) -&gt; play the timer</a:t>
             </a:r>
           </a:p>
@@ -6901,10 +6963,9 @@
           <a:lstStyle/>
           <a:p>
             <a:r>
-              <a:rPr lang="en-US" dirty="0" smtClean="0"/>
+              <a:rPr lang="en-US" dirty="0"/>
               <a:t>Server – State Diagram</a:t>
             </a:r>
-            <a:endParaRPr lang="en-US" dirty="0"/>
           </a:p>
         </p:txBody>
       </p:sp>
@@ -6943,10 +7004,9 @@
           <a:p>
             <a:pPr algn="ctr"/>
             <a:r>
-              <a:rPr lang="en-US" dirty="0" smtClean="0"/>
+              <a:rPr lang="en-US" dirty="0"/>
               <a:t>stable</a:t>
             </a:r>
-            <a:endParaRPr lang="en-US" dirty="0"/>
           </a:p>
         </p:txBody>
       </p:sp>
@@ -7030,10 +7090,9 @@
           <a:p>
             <a:pPr algn="ctr"/>
             <a:r>
-              <a:rPr lang="en-US" dirty="0" smtClean="0"/>
+              <a:rPr lang="en-US" dirty="0"/>
               <a:t>Started</a:t>
             </a:r>
-            <a:endParaRPr lang="en-US" dirty="0"/>
           </a:p>
         </p:txBody>
       </p:sp>
@@ -7117,10 +7176,9 @@
           <a:p>
             <a:pPr algn="ctr"/>
             <a:r>
-              <a:rPr lang="en-US" dirty="0" smtClean="0"/>
+              <a:rPr lang="en-US" dirty="0"/>
               <a:t>Finished</a:t>
             </a:r>
-            <a:endParaRPr lang="en-US" dirty="0"/>
           </a:p>
         </p:txBody>
       </p:sp>
@@ -7147,24 +7205,23 @@
           <a:lstStyle/>
           <a:p>
             <a:r>
-              <a:rPr lang="en-US" dirty="0" err="1" smtClean="0"/>
+              <a:rPr lang="en-US" dirty="0" err="1"/>
               <a:t>RunExam</a:t>
             </a:r>
             <a:r>
-              <a:rPr lang="en-US" dirty="0" smtClean="0"/>
+              <a:rPr lang="en-US" dirty="0"/>
               <a:t>() /</a:t>
             </a:r>
           </a:p>
           <a:p>
             <a:r>
-              <a:rPr lang="en-US" dirty="0" err="1" smtClean="0"/>
+              <a:rPr lang="en-US" dirty="0" err="1"/>
               <a:t>ExamRunning</a:t>
             </a:r>
             <a:r>
-              <a:rPr lang="en-US" dirty="0" smtClean="0"/>
+              <a:rPr lang="en-US" dirty="0"/>
               <a:t>=1</a:t>
             </a:r>
-            <a:endParaRPr lang="en-US" dirty="0"/>
           </a:p>
         </p:txBody>
       </p:sp>
@@ -7191,24 +7248,23 @@
           <a:lstStyle/>
           <a:p>
             <a:r>
-              <a:rPr lang="en-US" dirty="0" err="1" smtClean="0"/>
+              <a:rPr lang="en-US" dirty="0" err="1"/>
               <a:t>FinishAndRecord</a:t>
             </a:r>
             <a:r>
-              <a:rPr lang="en-US" dirty="0" smtClean="0"/>
+              <a:rPr lang="en-US" dirty="0"/>
               <a:t>() /</a:t>
             </a:r>
           </a:p>
           <a:p>
             <a:r>
-              <a:rPr lang="en-US" dirty="0" err="1" smtClean="0"/>
+              <a:rPr lang="en-US" dirty="0" err="1"/>
               <a:t>ExamRunning</a:t>
             </a:r>
             <a:r>
-              <a:rPr lang="en-US" dirty="0" smtClean="0"/>
+              <a:rPr lang="en-US" dirty="0"/>
               <a:t>=0</a:t>
             </a:r>
-            <a:endParaRPr lang="en-US" dirty="0"/>
           </a:p>
         </p:txBody>
       </p:sp>
@@ -7258,10 +7314,9 @@
           <a:lstStyle/>
           <a:p>
             <a:r>
-              <a:rPr lang="en-US" dirty="0" smtClean="0"/>
+              <a:rPr lang="en-US" dirty="0"/>
               <a:t>Client – State Diagram</a:t>
             </a:r>
-            <a:endParaRPr lang="en-US" dirty="0"/>
           </a:p>
         </p:txBody>
       </p:sp>
@@ -7300,10 +7355,9 @@
           <a:p>
             <a:pPr algn="ctr"/>
             <a:r>
-              <a:rPr lang="en-US" dirty="0" smtClean="0"/>
+              <a:rPr lang="en-US" dirty="0"/>
               <a:t>stable</a:t>
             </a:r>
-            <a:endParaRPr lang="en-US" dirty="0"/>
           </a:p>
         </p:txBody>
       </p:sp>
@@ -7387,10 +7441,9 @@
           <a:p>
             <a:pPr algn="ctr"/>
             <a:r>
-              <a:rPr lang="en-US" dirty="0" smtClean="0"/>
+              <a:rPr lang="en-US" dirty="0"/>
               <a:t>Started</a:t>
             </a:r>
-            <a:endParaRPr lang="en-US" dirty="0"/>
           </a:p>
         </p:txBody>
       </p:sp>
@@ -7474,10 +7527,9 @@
           <a:p>
             <a:pPr algn="ctr"/>
             <a:r>
-              <a:rPr lang="en-US" dirty="0" smtClean="0"/>
+              <a:rPr lang="en-US" dirty="0"/>
               <a:t>Finished</a:t>
             </a:r>
-            <a:endParaRPr lang="en-US" dirty="0"/>
           </a:p>
         </p:txBody>
       </p:sp>
@@ -7504,24 +7556,23 @@
           <a:lstStyle/>
           <a:p>
             <a:r>
-              <a:rPr lang="en-US" dirty="0" err="1" smtClean="0"/>
+              <a:rPr lang="en-US" dirty="0" err="1"/>
               <a:t>RunExam</a:t>
             </a:r>
             <a:r>
-              <a:rPr lang="en-US" dirty="0" smtClean="0"/>
+              <a:rPr lang="en-US" dirty="0"/>
               <a:t>() /</a:t>
             </a:r>
           </a:p>
           <a:p>
             <a:r>
-              <a:rPr lang="en-US" dirty="0" err="1" smtClean="0"/>
+              <a:rPr lang="en-US" dirty="0" err="1"/>
               <a:t>ExamRunning</a:t>
             </a:r>
             <a:r>
-              <a:rPr lang="en-US" dirty="0" smtClean="0"/>
+              <a:rPr lang="en-US" dirty="0"/>
               <a:t>=1</a:t>
             </a:r>
-            <a:endParaRPr lang="en-US" dirty="0"/>
           </a:p>
         </p:txBody>
       </p:sp>
@@ -7548,24 +7599,23 @@
           <a:lstStyle/>
           <a:p>
             <a:r>
-              <a:rPr lang="en-US" dirty="0" err="1" smtClean="0"/>
+              <a:rPr lang="en-US" dirty="0" err="1"/>
               <a:t>FinishAndRecord</a:t>
             </a:r>
             <a:r>
-              <a:rPr lang="en-US" dirty="0" smtClean="0"/>
+              <a:rPr lang="en-US" dirty="0"/>
               <a:t>() /</a:t>
             </a:r>
           </a:p>
           <a:p>
             <a:r>
-              <a:rPr lang="en-US" dirty="0" err="1" smtClean="0"/>
+              <a:rPr lang="en-US" dirty="0" err="1"/>
               <a:t>ExamRunning</a:t>
             </a:r>
             <a:r>
-              <a:rPr lang="en-US" dirty="0" smtClean="0"/>
+              <a:rPr lang="en-US" dirty="0"/>
               <a:t>=0</a:t>
             </a:r>
-            <a:endParaRPr lang="en-US" dirty="0"/>
           </a:p>
         </p:txBody>
       </p:sp>
@@ -7604,10 +7654,9 @@
           <a:p>
             <a:pPr algn="ctr"/>
             <a:r>
-              <a:rPr lang="en-US" dirty="0" smtClean="0"/>
+              <a:rPr lang="en-US" dirty="0"/>
               <a:t>Ready</a:t>
             </a:r>
-            <a:endParaRPr lang="en-US" dirty="0"/>
           </a:p>
         </p:txBody>
       </p:sp>
@@ -7634,7 +7683,7 @@
           <a:lstStyle/>
           <a:p>
             <a:r>
-              <a:rPr lang="en-US" dirty="0" smtClean="0"/>
+              <a:rPr lang="en-US" dirty="0"/>
               <a:t>! Running / x</a:t>
             </a:r>
           </a:p>
@@ -7720,7 +7769,7 @@
           <a:p>
             <a:pPr algn="ctr"/>
             <a:r>
-              <a:rPr lang="en-US" dirty="0" err="1" smtClean="0"/>
+              <a:rPr lang="en-US" dirty="0" err="1"/>
               <a:t>Cuttoff</a:t>
             </a:r>
             <a:endParaRPr lang="en-US" dirty="0"/>
@@ -7795,7 +7844,7 @@
           <a:lstStyle/>
           <a:p>
             <a:r>
-              <a:rPr lang="en-US" dirty="0" smtClean="0"/>
+              <a:rPr lang="en-US" dirty="0"/>
               <a:t>Running / x</a:t>
             </a:r>
           </a:p>
@@ -7836,10 +7885,9 @@
           <a:p>
             <a:pPr algn="ctr"/>
             <a:r>
-              <a:rPr lang="en-US" dirty="0" smtClean="0"/>
+              <a:rPr lang="en-US" dirty="0"/>
               <a:t>Resumed</a:t>
             </a:r>
-            <a:endParaRPr lang="en-US" dirty="0"/>
           </a:p>
         </p:txBody>
       </p:sp>
@@ -7911,7 +7959,7 @@
           <a:lstStyle/>
           <a:p>
             <a:r>
-              <a:rPr lang="en-US" dirty="0" smtClean="0"/>
+              <a:rPr lang="en-US" dirty="0"/>
               <a:t>Running / x</a:t>
             </a:r>
           </a:p>
@@ -7940,7 +7988,7 @@
           <a:lstStyle/>
           <a:p>
             <a:r>
-              <a:rPr lang="en-US" dirty="0" smtClean="0"/>
+              <a:rPr lang="en-US" dirty="0"/>
               <a:t>! Running / x</a:t>
             </a:r>
           </a:p>
@@ -8021,25 +8069,6 @@
           <a:chExt cx="0" cy="0"/>
         </a:xfrm>
       </p:grpSpPr>
-      <p:sp>
-        <p:nvSpPr>
-          <p:cNvPr id="2" name="Title 1"/>
-          <p:cNvSpPr>
-            <a:spLocks noGrp="1"/>
-          </p:cNvSpPr>
-          <p:nvPr>
-            <p:ph type="title"/>
-          </p:nvPr>
-        </p:nvSpPr>
-        <p:spPr/>
-        <p:txBody>
-          <a:bodyPr/>
-          <a:lstStyle/>
-          <a:p>
-            <a:endParaRPr lang="en-US"/>
-          </a:p>
-        </p:txBody>
-      </p:sp>
       <p:pic>
         <p:nvPicPr>
           <p:cNvPr id="6" name="Picture 5"/>
@@ -8062,7 +8091,7 @@
         </p:blipFill>
         <p:spPr>
           <a:xfrm>
-            <a:off x="3657600" y="2631830"/>
+            <a:off x="8845420" y="582572"/>
             <a:ext cx="1772529" cy="1772529"/>
           </a:xfrm>
           <a:prstGeom prst="rect">
@@ -8194,6 +8223,124 @@
           </a:extLst>
         </p:spPr>
       </p:pic>
+      <p:grpSp>
+        <p:nvGrpSpPr>
+          <p:cNvPr id="5" name="Group 4"/>
+          <p:cNvGrpSpPr/>
+          <p:nvPr/>
+        </p:nvGrpSpPr>
+        <p:grpSpPr>
+          <a:xfrm>
+            <a:off x="2195185" y="2164284"/>
+            <a:ext cx="2202024" cy="2098790"/>
+            <a:chOff x="709127" y="2631830"/>
+            <a:chExt cx="2202024" cy="2098790"/>
+          </a:xfrm>
+        </p:grpSpPr>
+        <p:pic>
+          <p:nvPicPr>
+            <p:cNvPr id="3" name="Picture 2"/>
+            <p:cNvPicPr>
+              <a:picLocks noChangeAspect="1"/>
+            </p:cNvPicPr>
+            <p:nvPr/>
+          </p:nvPicPr>
+          <p:blipFill rotWithShape="1">
+            <a:blip r:embed="rId6">
+              <a:duotone>
+                <a:prstClr val="black"/>
+                <a:srgbClr val="3366FF">
+                  <a:tint val="45000"/>
+                  <a:satMod val="400000"/>
+                </a:srgbClr>
+              </a:duotone>
+              <a:extLst>
+                <a:ext uri="{BEBA8EAE-BF5A-486C-A8C5-ECC9F3942E4B}">
+                  <a14:imgProps xmlns:a14="http://schemas.microsoft.com/office/drawing/2010/main">
+                    <a14:imgLayer r:embed="rId7">
+                      <a14:imgEffect>
+                        <a14:backgroundRemoval t="7667" b="90000" l="10000" r="90000">
+                          <a14:foregroundMark x1="28000" y1="38667" x2="34333" y2="44667"/>
+                          <a14:foregroundMark x1="40667" y1="43000" x2="37333" y2="36000"/>
+                          <a14:foregroundMark x1="37333" y1="36000" x2="37333" y2="36000"/>
+                          <a14:foregroundMark x1="38667" y1="38667" x2="71667" y2="23000"/>
+                          <a14:foregroundMark x1="75667" y1="32333" x2="68667" y2="64333"/>
+                          <a14:foregroundMark x1="61333" y1="68667" x2="34667" y2="76667"/>
+                          <a14:foregroundMark x1="29667" y1="77000" x2="25667" y2="74667"/>
+                          <a14:foregroundMark x1="23667" y1="70333" x2="21667" y2="48000"/>
+                          <a14:foregroundMark x1="23000" y1="43333" x2="57667" y2="22333"/>
+                          <a14:foregroundMark x1="58333" y1="33667" x2="67667" y2="65333"/>
+                          <a14:foregroundMark x1="63000" y1="63000" x2="24667" y2="57667"/>
+                          <a14:foregroundMark x1="34667" y1="66000" x2="57667" y2="30333"/>
+                          <a14:foregroundMark x1="49000" y1="20333" x2="24667" y2="40667"/>
+                        </a14:backgroundRemoval>
+                      </a14:imgEffect>
+                    </a14:imgLayer>
+                  </a14:imgProps>
+                </a:ext>
+                <a:ext uri="{28A0092B-C50C-407E-A947-70E740481C1C}">
+                  <a14:useLocalDpi xmlns:a14="http://schemas.microsoft.com/office/drawing/2010/main" val="0"/>
+                </a:ext>
+              </a:extLst>
+            </a:blip>
+            <a:srcRect l="8167" t="13360" r="14771" b="13191"/>
+            <a:stretch/>
+          </p:blipFill>
+          <p:spPr>
+            <a:xfrm>
+              <a:off x="709127" y="2631830"/>
+              <a:ext cx="2202024" cy="2098790"/>
+            </a:xfrm>
+            <a:prstGeom prst="rect">
+              <a:avLst/>
+            </a:prstGeom>
+          </p:spPr>
+        </p:pic>
+        <p:sp>
+          <p:nvSpPr>
+            <p:cNvPr id="4" name="Rectangle: Rounded Corners 3"/>
+            <p:cNvSpPr/>
+            <p:nvPr/>
+          </p:nvSpPr>
+          <p:spPr>
+            <a:xfrm>
+              <a:off x="784736" y="2631830"/>
+              <a:ext cx="1091683" cy="646378"/>
+            </a:xfrm>
+            <a:prstGeom prst="roundRect">
+              <a:avLst/>
+            </a:prstGeom>
+            <a:solidFill>
+              <a:srgbClr val="FF0000"/>
+            </a:solidFill>
+          </p:spPr>
+          <p:style>
+            <a:lnRef idx="1">
+              <a:schemeClr val="accent2"/>
+            </a:lnRef>
+            <a:fillRef idx="3">
+              <a:schemeClr val="accent2"/>
+            </a:fillRef>
+            <a:effectRef idx="2">
+              <a:schemeClr val="accent2"/>
+            </a:effectRef>
+            <a:fontRef idx="minor">
+              <a:schemeClr val="lt1"/>
+            </a:fontRef>
+          </p:style>
+          <p:txBody>
+            <a:bodyPr rtlCol="0" anchor="ctr"/>
+            <a:lstStyle/>
+            <a:p>
+              <a:pPr algn="ctr"/>
+              <a:r>
+                <a:rPr lang="en-US" sz="4000" b="1" dirty="0"/>
+                <a:t>PDF</a:t>
+              </a:r>
+            </a:p>
+          </p:txBody>
+        </p:sp>
+      </p:grpSp>
     </p:spTree>
     <p:extLst>
       <p:ext uri="{BB962C8B-B14F-4D97-AF65-F5344CB8AC3E}">

</xml_diff>

<commit_message>
<div id="coco"></div> <p style="color: blue; font-weight: bold "> manga v(2.12.0.2) Fix Reading Recorded Data </p>
<pre>
<span style="font-weight: bold ">Server Side:</span>
   - Fix coding bugs in Exam Loader's classes, now it can be extended to any other file types.
   - Fix the reading of Timing data from file, now it can detect the total spend time and
      appended to the student so that he can connect again after finish.
   - add feature of disconnected status.
   - add feature of Ungrade student and Unfinish him.
   - GUI: change IP and port to be in one label

Client Side:
   - GUI: change the style of quesion list navigator.

Gradle Side:-
   -

Problem NOT SOLVED YET:
   - we need to move the validation method to be inside Student class
   - why the heap memory is keep increasing on each backup?
   - let the multiple choices boxes to be hidden without taking palce.
   - change exam time
   - ODS file loader still not implemented 100%
</pre>
</commit_message>
<xml_diff>
--- a/data/Design.pptx
+++ b/data/Design.pptx
@@ -14,7 +14,8 @@
     <p:sldId id="260" r:id="rId8"/>
     <p:sldId id="261" r:id="rId9"/>
     <p:sldId id="258" r:id="rId10"/>
-    <p:sldId id="265" r:id="rId11"/>
+    <p:sldId id="266" r:id="rId11"/>
+    <p:sldId id="265" r:id="rId12"/>
   </p:sldIdLst>
   <p:sldSz cx="12192000" cy="6858000"/>
   <p:notesSz cx="6858000" cy="9144000"/>
@@ -347,7 +348,7 @@
           <a:p>
             <a:fld id="{FCC48F40-D526-46B5-AAE0-C515735D5BAE}" type="datetimeFigureOut">
               <a:rPr lang="en-US" smtClean="0"/>
-              <a:t>05/07/2019</a:t>
+              <a:t>14/07/2019</a:t>
             </a:fld>
             <a:endParaRPr lang="en-US"/>
           </a:p>
@@ -555,7 +556,7 @@
           <a:p>
             <a:fld id="{FCC48F40-D526-46B5-AAE0-C515735D5BAE}" type="datetimeFigureOut">
               <a:rPr lang="en-US" smtClean="0"/>
-              <a:t>05/07/2019</a:t>
+              <a:t>14/07/2019</a:t>
             </a:fld>
             <a:endParaRPr lang="en-US"/>
           </a:p>
@@ -811,7 +812,7 @@
           <a:p>
             <a:fld id="{FCC48F40-D526-46B5-AAE0-C515735D5BAE}" type="datetimeFigureOut">
               <a:rPr lang="en-US" smtClean="0"/>
-              <a:t>05/07/2019</a:t>
+              <a:t>14/07/2019</a:t>
             </a:fld>
             <a:endParaRPr lang="en-US"/>
           </a:p>
@@ -1025,7 +1026,7 @@
             <a:fld id="{FCC48F40-D526-46B5-AAE0-C515735D5BAE}" type="datetimeFigureOut">
               <a:rPr lang="en-US" smtClean="0"/>
               <a:pPr/>
-              <a:t>05/07/2019</a:t>
+              <a:t>14/07/2019</a:t>
             </a:fld>
             <a:endParaRPr lang="en-US"/>
           </a:p>
@@ -1359,7 +1360,7 @@
           <a:p>
             <a:fld id="{FCC48F40-D526-46B5-AAE0-C515735D5BAE}" type="datetimeFigureOut">
               <a:rPr lang="en-US" smtClean="0"/>
-              <a:t>05/07/2019</a:t>
+              <a:t>14/07/2019</a:t>
             </a:fld>
             <a:endParaRPr lang="en-US"/>
           </a:p>
@@ -1634,7 +1635,7 @@
           <a:p>
             <a:fld id="{FCC48F40-D526-46B5-AAE0-C515735D5BAE}" type="datetimeFigureOut">
               <a:rPr lang="en-US" smtClean="0"/>
-              <a:t>05/07/2019</a:t>
+              <a:t>14/07/2019</a:t>
             </a:fld>
             <a:endParaRPr lang="en-US"/>
           </a:p>
@@ -2013,7 +2014,7 @@
           <a:p>
             <a:fld id="{FCC48F40-D526-46B5-AAE0-C515735D5BAE}" type="datetimeFigureOut">
               <a:rPr lang="en-US" smtClean="0"/>
-              <a:t>05/07/2019</a:t>
+              <a:t>14/07/2019</a:t>
             </a:fld>
             <a:endParaRPr lang="en-US"/>
           </a:p>
@@ -2131,7 +2132,7 @@
           <a:p>
             <a:fld id="{FCC48F40-D526-46B5-AAE0-C515735D5BAE}" type="datetimeFigureOut">
               <a:rPr lang="en-US" smtClean="0"/>
-              <a:t>05/07/2019</a:t>
+              <a:t>14/07/2019</a:t>
             </a:fld>
             <a:endParaRPr lang="en-US"/>
           </a:p>
@@ -2302,7 +2303,7 @@
           <a:p>
             <a:fld id="{FCC48F40-D526-46B5-AAE0-C515735D5BAE}" type="datetimeFigureOut">
               <a:rPr lang="en-US" smtClean="0"/>
-              <a:t>05/07/2019</a:t>
+              <a:t>14/07/2019</a:t>
             </a:fld>
             <a:endParaRPr lang="en-US"/>
           </a:p>
@@ -2656,7 +2657,7 @@
           <a:p>
             <a:fld id="{FCC48F40-D526-46B5-AAE0-C515735D5BAE}" type="datetimeFigureOut">
               <a:rPr lang="en-US" smtClean="0"/>
-              <a:t>05/07/2019</a:t>
+              <a:t>14/07/2019</a:t>
             </a:fld>
             <a:endParaRPr lang="en-US"/>
           </a:p>
@@ -3038,7 +3039,7 @@
           <a:p>
             <a:fld id="{FCC48F40-D526-46B5-AAE0-C515735D5BAE}" type="datetimeFigureOut">
               <a:rPr lang="en-US" smtClean="0"/>
-              <a:t>05/07/2019</a:t>
+              <a:t>14/07/2019</a:t>
             </a:fld>
             <a:endParaRPr lang="en-US"/>
           </a:p>
@@ -3325,7 +3326,7 @@
           <a:p>
             <a:fld id="{FCC48F40-D526-46B5-AAE0-C515735D5BAE}" type="datetimeFigureOut">
               <a:rPr lang="en-US" smtClean="0"/>
-              <a:t>05/07/2019</a:t>
+              <a:t>14/07/2019</a:t>
             </a:fld>
             <a:endParaRPr lang="en-US"/>
           </a:p>
@@ -3936,16 +3937,22 @@
       </p:grpSpPr>
       <p:grpSp>
         <p:nvGrpSpPr>
-          <p:cNvPr id="6" name="Group 5"/>
+          <p:cNvPr id="9" name="Group 8">
+            <a:extLst>
+              <a:ext uri="{FF2B5EF4-FFF2-40B4-BE49-F238E27FC236}">
+                <a16:creationId xmlns:a16="http://schemas.microsoft.com/office/drawing/2014/main" id="{F1C78956-EF48-4576-85B0-89BC4AFF67C7}"/>
+              </a:ext>
+            </a:extLst>
+          </p:cNvPr>
           <p:cNvGrpSpPr/>
           <p:nvPr/>
         </p:nvGrpSpPr>
         <p:grpSpPr>
           <a:xfrm>
-            <a:off x="2084058" y="969093"/>
-            <a:ext cx="7634977" cy="3206981"/>
+            <a:off x="203201" y="764855"/>
+            <a:ext cx="7634977" cy="3219846"/>
             <a:chOff x="2084058" y="969093"/>
-            <a:chExt cx="7634977" cy="3206981"/>
+            <a:chExt cx="7634977" cy="3219846"/>
           </a:xfrm>
         </p:grpSpPr>
         <p:pic>
@@ -3966,36 +3973,6 @@
             <a:xfrm>
               <a:off x="2084058" y="969093"/>
               <a:ext cx="7634977" cy="3206981"/>
-            </a:xfrm>
-            <a:prstGeom prst="rect">
-              <a:avLst/>
-            </a:prstGeom>
-          </p:spPr>
-        </p:pic>
-        <p:pic>
-          <p:nvPicPr>
-            <p:cNvPr id="3" name="Picture 2"/>
-            <p:cNvPicPr>
-              <a:picLocks noChangeAspect="1"/>
-            </p:cNvPicPr>
-            <p:nvPr/>
-          </p:nvPicPr>
-          <p:blipFill>
-            <a:blip r:embed="rId3">
-              <a:extLst>
-                <a:ext uri="{28A0092B-C50C-407E-A947-70E740481C1C}">
-                  <a14:useLocalDpi xmlns:a14="http://schemas.microsoft.com/office/drawing/2010/main" val="0"/>
-                </a:ext>
-              </a:extLst>
-            </a:blip>
-            <a:stretch>
-              <a:fillRect/>
-            </a:stretch>
-          </p:blipFill>
-          <p:spPr>
-            <a:xfrm>
-              <a:off x="2829211" y="1326617"/>
-              <a:ext cx="1176417" cy="1176417"/>
             </a:xfrm>
             <a:prstGeom prst="rect">
               <a:avLst/>
@@ -4057,7 +4034,7 @@
           <p:spPr>
             <a:xfrm>
               <a:off x="4719676" y="1326617"/>
-              <a:ext cx="4853532" cy="2800767"/>
+              <a:ext cx="4853532" cy="2862322"/>
             </a:xfrm>
             <a:prstGeom prst="rect">
               <a:avLst/>
@@ -4075,7 +4052,7 @@
                   <a:latin typeface="Courier New" panose="02070309020205020404" pitchFamily="49" charset="0"/>
                   <a:cs typeface="Courier New" panose="02070309020205020404" pitchFamily="49" charset="0"/>
                 </a:rPr>
-                <a:t>Version: 2.3.1.50</a:t>
+                <a:t>Version:</a:t>
               </a:r>
             </a:p>
             <a:p>
@@ -4084,7 +4061,7 @@
                   <a:latin typeface="Courier New" panose="02070309020205020404" pitchFamily="49" charset="0"/>
                   <a:cs typeface="Courier New" panose="02070309020205020404" pitchFamily="49" charset="0"/>
                 </a:rPr>
-                <a:t>Release: 5 January 2017</a:t>
+                <a:t>Release:</a:t>
               </a:r>
             </a:p>
             <a:p>
@@ -4114,7 +4091,656 @@
                   <a:latin typeface="Courier New" panose="02070309020205020404" pitchFamily="49" charset="0"/>
                   <a:cs typeface="Courier New" panose="02070309020205020404" pitchFamily="49" charset="0"/>
                 </a:rPr>
-                <a:t>All copy rights are received (c) 2016-2017.</a:t>
+                <a:t>Copyright </a:t>
+              </a:r>
+              <a:r>
+                <a:rPr lang="en-US" sz="2000" b="1" dirty="0">
+                  <a:latin typeface="Courier New" panose="02070309020205020404" pitchFamily="49" charset="0"/>
+                  <a:cs typeface="Courier New" panose="02070309020205020404" pitchFamily="49" charset="0"/>
+                </a:rPr>
+                <a:t>©</a:t>
+              </a:r>
+              <a:r>
+                <a:rPr lang="en-US" sz="1600" b="1" dirty="0">
+                  <a:latin typeface="Courier New" panose="02070309020205020404" pitchFamily="49" charset="0"/>
+                  <a:cs typeface="Courier New" panose="02070309020205020404" pitchFamily="49" charset="0"/>
+                </a:rPr>
+                <a:t> 2016-2020 Eng. Sami Alfattani. All Rights Received.</a:t>
+              </a:r>
+            </a:p>
+            <a:p>
+              <a:endParaRPr lang="en-US" sz="1600" b="1" dirty="0">
+                <a:latin typeface="Courier New" panose="02070309020205020404" pitchFamily="49" charset="0"/>
+                <a:cs typeface="Courier New" panose="02070309020205020404" pitchFamily="49" charset="0"/>
+              </a:endParaRPr>
+            </a:p>
+            <a:p>
+              <a:r>
+                <a:rPr lang="en-US" sz="1600" b="1" dirty="0">
+                  <a:latin typeface="Courier New" panose="02070309020205020404" pitchFamily="49" charset="0"/>
+                  <a:cs typeface="Courier New" panose="02070309020205020404" pitchFamily="49" charset="0"/>
+                </a:rPr>
+                <a:t>Programmed by Eng. Sami A. Alfattani</a:t>
+              </a:r>
+            </a:p>
+            <a:p>
+              <a:r>
+                <a:rPr lang="en-US" sz="1600" b="1" dirty="0">
+                  <a:latin typeface="Courier New" panose="02070309020205020404" pitchFamily="49" charset="0"/>
+                  <a:cs typeface="Courier New" panose="02070309020205020404" pitchFamily="49" charset="0"/>
+                </a:rPr>
+                <a:t>Contact: </a:t>
+              </a:r>
+              <a:r>
+                <a:rPr lang="en-US" sz="1600" b="1" dirty="0">
+                  <a:solidFill>
+                    <a:srgbClr val="3366FF"/>
+                  </a:solidFill>
+                  <a:latin typeface="Courier New" panose="02070309020205020404" pitchFamily="49" charset="0"/>
+                  <a:cs typeface="Courier New" panose="02070309020205020404" pitchFamily="49" charset="0"/>
+                </a:rPr>
+                <a:t>Sami_Alfattani@hotmail.com</a:t>
+              </a:r>
+            </a:p>
+            <a:p>
+              <a:r>
+                <a:rPr lang="en-US" sz="1600" b="1" dirty="0">
+                  <a:latin typeface="Courier New" panose="02070309020205020404" pitchFamily="49" charset="0"/>
+                  <a:cs typeface="Courier New" panose="02070309020205020404" pitchFamily="49" charset="0"/>
+                </a:rPr>
+                <a:t>Mobile : +966-5-645-99127</a:t>
+              </a:r>
+            </a:p>
+          </p:txBody>
+        </p:sp>
+        <p:pic>
+          <p:nvPicPr>
+            <p:cNvPr id="8" name="Picture 7" descr="A close up of a sign&#10;&#10;Description automatically generated">
+              <a:extLst>
+                <a:ext uri="{FF2B5EF4-FFF2-40B4-BE49-F238E27FC236}">
+                  <a16:creationId xmlns:a16="http://schemas.microsoft.com/office/drawing/2014/main" id="{68EC4B51-CF3A-49E6-8B64-281657321C61}"/>
+                </a:ext>
+              </a:extLst>
+            </p:cNvPr>
+            <p:cNvPicPr>
+              <a:picLocks noChangeAspect="1"/>
+            </p:cNvPicPr>
+            <p:nvPr/>
+          </p:nvPicPr>
+          <p:blipFill rotWithShape="1">
+            <a:blip r:embed="rId3">
+              <a:extLst>
+                <a:ext uri="{BEBA8EAE-BF5A-486C-A8C5-ECC9F3942E4B}">
+                  <a14:imgProps xmlns:a14="http://schemas.microsoft.com/office/drawing/2010/main">
+                    <a14:imgLayer r:embed="rId4">
+                      <a14:imgEffect>
+                        <a14:backgroundRemoval t="1953" b="98047" l="4297" r="96094">
+                          <a14:foregroundMark x1="42969" y1="20313" x2="63672" y2="42188"/>
+                          <a14:foregroundMark x1="63672" y1="42188" x2="71094" y2="57813"/>
+                          <a14:foregroundMark x1="81641" y1="28516" x2="77344" y2="57813"/>
+                          <a14:foregroundMark x1="77344" y1="57813" x2="57422" y2="79688"/>
+                          <a14:foregroundMark x1="57422" y1="79688" x2="29297" y2="76563"/>
+                          <a14:foregroundMark x1="29297" y1="76563" x2="27344" y2="75000"/>
+                          <a14:foregroundMark x1="15625" y1="70703" x2="13281" y2="38281"/>
+                          <a14:foregroundMark x1="13281" y1="38281" x2="39063" y2="16797"/>
+                          <a14:foregroundMark x1="39063" y1="16797" x2="63281" y2="8203"/>
+                          <a14:foregroundMark x1="67578" y1="9375" x2="91406" y2="25391"/>
+                          <a14:foregroundMark x1="91406" y1="25391" x2="96484" y2="55469"/>
+                          <a14:foregroundMark x1="96484" y1="55469" x2="85156" y2="75391"/>
+                          <a14:foregroundMark x1="74609" y1="80859" x2="53125" y2="62109"/>
+                          <a14:foregroundMark x1="53125" y1="62109" x2="23828" y2="12500"/>
+                          <a14:foregroundMark x1="69922" y1="17188" x2="25391" y2="67188"/>
+                          <a14:foregroundMark x1="25391" y1="67188" x2="11719" y2="77344"/>
+                          <a14:foregroundMark x1="21484" y1="60938" x2="4297" y2="47266"/>
+                          <a14:foregroundMark x1="53125" y1="1563" x2="59375" y2="63672"/>
+                          <a14:foregroundMark x1="59375" y1="63672" x2="56641" y2="98047"/>
+                          <a14:foregroundMark x1="49609" y1="16797" x2="21484" y2="13672"/>
+                          <a14:foregroundMark x1="21484" y1="13672" x2="14453" y2="18359"/>
+                          <a14:foregroundMark x1="18750" y1="19531" x2="42188" y2="1953"/>
+                          <a14:foregroundMark x1="42188" y1="1953" x2="46094" y2="1953"/>
+                          <a14:foregroundMark x1="55078" y1="15234" x2="37109" y2="44922"/>
+                          <a14:foregroundMark x1="37109" y1="44922" x2="12109" y2="55859"/>
+                          <a14:foregroundMark x1="21484" y1="25391" x2="36719" y2="49609"/>
+                          <a14:foregroundMark x1="36719" y1="49609" x2="62500" y2="64453"/>
+                          <a14:foregroundMark x1="62500" y1="64453" x2="88281" y2="53516"/>
+                          <a14:foregroundMark x1="88281" y1="53516" x2="53125" y2="62500"/>
+                          <a14:foregroundMark x1="53125" y1="62500" x2="61719" y2="42188"/>
+                          <a14:foregroundMark x1="33203" y1="58984" x2="60156" y2="81641"/>
+                          <a14:foregroundMark x1="60156" y1="81641" x2="72266" y2="84375"/>
+                          <a14:foregroundMark x1="84766" y1="59375" x2="54688" y2="75391"/>
+                        </a14:backgroundRemoval>
+                      </a14:imgEffect>
+                    </a14:imgLayer>
+                  </a14:imgProps>
+                </a:ext>
+                <a:ext uri="{28A0092B-C50C-407E-A947-70E740481C1C}">
+                  <a14:useLocalDpi xmlns:a14="http://schemas.microsoft.com/office/drawing/2010/main" val="0"/>
+                </a:ext>
+              </a:extLst>
+            </a:blip>
+            <a:srcRect l="-2789" t="-2957" r="-4273" b="-1413"/>
+            <a:stretch/>
+          </p:blipFill>
+          <p:spPr>
+            <a:xfrm>
+              <a:off x="2618792" y="1194788"/>
+              <a:ext cx="1560555" cy="1428014"/>
+            </a:xfrm>
+            <a:prstGeom prst="rect">
+              <a:avLst/>
+            </a:prstGeom>
+          </p:spPr>
+        </p:pic>
+      </p:grpSp>
+      <p:grpSp>
+        <p:nvGrpSpPr>
+          <p:cNvPr id="10" name="Group 9">
+            <a:extLst>
+              <a:ext uri="{FF2B5EF4-FFF2-40B4-BE49-F238E27FC236}">
+                <a16:creationId xmlns:a16="http://schemas.microsoft.com/office/drawing/2014/main" id="{389371B6-11BB-4351-BE23-33108269AFCD}"/>
+              </a:ext>
+            </a:extLst>
+          </p:cNvPr>
+          <p:cNvGrpSpPr/>
+          <p:nvPr/>
+        </p:nvGrpSpPr>
+        <p:grpSpPr>
+          <a:xfrm>
+            <a:off x="4480124" y="2450760"/>
+            <a:ext cx="7634977" cy="3219846"/>
+            <a:chOff x="2084058" y="969093"/>
+            <a:chExt cx="7634977" cy="3219846"/>
+          </a:xfrm>
+        </p:grpSpPr>
+        <p:pic>
+          <p:nvPicPr>
+            <p:cNvPr id="11" name="Picture 10">
+              <a:extLst>
+                <a:ext uri="{FF2B5EF4-FFF2-40B4-BE49-F238E27FC236}">
+                  <a16:creationId xmlns:a16="http://schemas.microsoft.com/office/drawing/2014/main" id="{E2467467-3336-469B-8207-60FCEA3FF38F}"/>
+                </a:ext>
+              </a:extLst>
+            </p:cNvPr>
+            <p:cNvPicPr>
+              <a:picLocks noChangeAspect="1"/>
+            </p:cNvPicPr>
+            <p:nvPr/>
+          </p:nvPicPr>
+          <p:blipFill>
+            <a:blip r:embed="rId2"/>
+            <a:stretch>
+              <a:fillRect/>
+            </a:stretch>
+          </p:blipFill>
+          <p:spPr>
+            <a:xfrm>
+              <a:off x="2084058" y="969093"/>
+              <a:ext cx="7634977" cy="3206981"/>
+            </a:xfrm>
+            <a:prstGeom prst="rect">
+              <a:avLst/>
+            </a:prstGeom>
+          </p:spPr>
+        </p:pic>
+        <p:pic>
+          <p:nvPicPr>
+            <p:cNvPr id="12" name="Picture 11">
+              <a:extLst>
+                <a:ext uri="{FF2B5EF4-FFF2-40B4-BE49-F238E27FC236}">
+                  <a16:creationId xmlns:a16="http://schemas.microsoft.com/office/drawing/2014/main" id="{004CB1BD-5AD7-41DA-B03A-385CEC003B9B}"/>
+                </a:ext>
+              </a:extLst>
+            </p:cNvPr>
+            <p:cNvPicPr>
+              <a:picLocks noChangeAspect="1"/>
+            </p:cNvPicPr>
+            <p:nvPr/>
+          </p:nvPicPr>
+          <p:blipFill>
+            <a:blip r:embed="rId5">
+              <a:extLst>
+                <a:ext uri="{28A0092B-C50C-407E-A947-70E740481C1C}">
+                  <a14:useLocalDpi xmlns:a14="http://schemas.microsoft.com/office/drawing/2010/main" val="0"/>
+                </a:ext>
+              </a:extLst>
+            </a:blip>
+            <a:stretch>
+              <a:fillRect/>
+            </a:stretch>
+          </p:blipFill>
+          <p:spPr>
+            <a:xfrm>
+              <a:off x="2829212" y="1326617"/>
+              <a:ext cx="1176417" cy="1176417"/>
+            </a:xfrm>
+            <a:prstGeom prst="rect">
+              <a:avLst/>
+            </a:prstGeom>
+          </p:spPr>
+        </p:pic>
+        <p:sp>
+          <p:nvSpPr>
+            <p:cNvPr id="13" name="TextBox 12">
+              <a:extLst>
+                <a:ext uri="{FF2B5EF4-FFF2-40B4-BE49-F238E27FC236}">
+                  <a16:creationId xmlns:a16="http://schemas.microsoft.com/office/drawing/2014/main" id="{F17315CC-3D7B-4FFE-8793-FDEE910A8B6A}"/>
+                </a:ext>
+              </a:extLst>
+            </p:cNvPr>
+            <p:cNvSpPr txBox="1"/>
+            <p:nvPr/>
+          </p:nvSpPr>
+          <p:spPr>
+            <a:xfrm>
+              <a:off x="2187757" y="2622802"/>
+              <a:ext cx="2459328" cy="1077218"/>
+            </a:xfrm>
+            <a:prstGeom prst="rect">
+              <a:avLst/>
+            </a:prstGeom>
+            <a:noFill/>
+          </p:spPr>
+          <p:txBody>
+            <a:bodyPr wrap="none" rtlCol="0">
+              <a:spAutoFit/>
+            </a:bodyPr>
+            <a:lstStyle/>
+            <a:p>
+              <a:pPr algn="ctr"/>
+              <a:r>
+                <a:rPr lang="en-US" sz="3200" dirty="0">
+                  <a:solidFill>
+                    <a:srgbClr val="3366FF"/>
+                  </a:solidFill>
+                  <a:latin typeface="Cooper Black" panose="0208090404030B020404" pitchFamily="18" charset="0"/>
+                </a:rPr>
+                <a:t>E-Quiz</a:t>
+              </a:r>
+            </a:p>
+            <a:p>
+              <a:r>
+                <a:rPr lang="en-US" sz="3200" dirty="0">
+                  <a:solidFill>
+                    <a:srgbClr val="3366FF"/>
+                  </a:solidFill>
+                  <a:latin typeface="Cooper Black" panose="0208090404030B020404" pitchFamily="18" charset="0"/>
+                </a:rPr>
+                <a:t>Client Side</a:t>
+              </a:r>
+            </a:p>
+          </p:txBody>
+        </p:sp>
+        <p:sp>
+          <p:nvSpPr>
+            <p:cNvPr id="14" name="TextBox 13">
+              <a:extLst>
+                <a:ext uri="{FF2B5EF4-FFF2-40B4-BE49-F238E27FC236}">
+                  <a16:creationId xmlns:a16="http://schemas.microsoft.com/office/drawing/2014/main" id="{01BDDD13-C38D-4A8D-BA0D-3A219C87744E}"/>
+                </a:ext>
+              </a:extLst>
+            </p:cNvPr>
+            <p:cNvSpPr txBox="1"/>
+            <p:nvPr/>
+          </p:nvSpPr>
+          <p:spPr>
+            <a:xfrm>
+              <a:off x="4719676" y="1326617"/>
+              <a:ext cx="4853532" cy="2862322"/>
+            </a:xfrm>
+            <a:prstGeom prst="rect">
+              <a:avLst/>
+            </a:prstGeom>
+            <a:noFill/>
+          </p:spPr>
+          <p:txBody>
+            <a:bodyPr wrap="square" rtlCol="0">
+              <a:spAutoFit/>
+            </a:bodyPr>
+            <a:lstStyle/>
+            <a:p>
+              <a:r>
+                <a:rPr lang="en-US" sz="1600" b="1" dirty="0">
+                  <a:latin typeface="Courier New" panose="02070309020205020404" pitchFamily="49" charset="0"/>
+                  <a:cs typeface="Courier New" panose="02070309020205020404" pitchFamily="49" charset="0"/>
+                </a:rPr>
+                <a:t>Version:</a:t>
+              </a:r>
+            </a:p>
+            <a:p>
+              <a:r>
+                <a:rPr lang="en-US" sz="1600" b="1" dirty="0">
+                  <a:latin typeface="Courier New" panose="02070309020205020404" pitchFamily="49" charset="0"/>
+                  <a:cs typeface="Courier New" panose="02070309020205020404" pitchFamily="49" charset="0"/>
+                </a:rPr>
+                <a:t>Release:</a:t>
+              </a:r>
+            </a:p>
+            <a:p>
+              <a:r>
+                <a:rPr lang="en-US" sz="1600" b="1" dirty="0">
+                  <a:latin typeface="Courier New" panose="02070309020205020404" pitchFamily="49" charset="0"/>
+                  <a:cs typeface="Courier New" panose="02070309020205020404" pitchFamily="49" charset="0"/>
+                </a:rPr>
+                <a:t>License: Freeware</a:t>
+              </a:r>
+            </a:p>
+            <a:p>
+              <a:endParaRPr lang="en-US" sz="1600" b="1" dirty="0">
+                <a:latin typeface="Courier New" panose="02070309020205020404" pitchFamily="49" charset="0"/>
+                <a:cs typeface="Courier New" panose="02070309020205020404" pitchFamily="49" charset="0"/>
+              </a:endParaRPr>
+            </a:p>
+            <a:p>
+              <a:endParaRPr lang="en-US" sz="1600" b="1" dirty="0">
+                <a:latin typeface="Courier New" panose="02070309020205020404" pitchFamily="49" charset="0"/>
+                <a:cs typeface="Courier New" panose="02070309020205020404" pitchFamily="49" charset="0"/>
+              </a:endParaRPr>
+            </a:p>
+            <a:p>
+              <a:r>
+                <a:rPr lang="en-US" sz="1600" b="1" dirty="0">
+                  <a:latin typeface="Courier New" panose="02070309020205020404" pitchFamily="49" charset="0"/>
+                  <a:cs typeface="Courier New" panose="02070309020205020404" pitchFamily="49" charset="0"/>
+                </a:rPr>
+                <a:t>Copyright </a:t>
+              </a:r>
+              <a:r>
+                <a:rPr lang="en-US" sz="2000" b="1" dirty="0">
+                  <a:latin typeface="Courier New" panose="02070309020205020404" pitchFamily="49" charset="0"/>
+                  <a:cs typeface="Courier New" panose="02070309020205020404" pitchFamily="49" charset="0"/>
+                </a:rPr>
+                <a:t>©</a:t>
+              </a:r>
+              <a:r>
+                <a:rPr lang="en-US" sz="1600" b="1" dirty="0">
+                  <a:latin typeface="Courier New" panose="02070309020205020404" pitchFamily="49" charset="0"/>
+                  <a:cs typeface="Courier New" panose="02070309020205020404" pitchFamily="49" charset="0"/>
+                </a:rPr>
+                <a:t> 2016-2020 Eng. Sami Alfattani. All Rights Received.</a:t>
+              </a:r>
+            </a:p>
+            <a:p>
+              <a:endParaRPr lang="en-US" sz="1600" b="1" dirty="0">
+                <a:latin typeface="Courier New" panose="02070309020205020404" pitchFamily="49" charset="0"/>
+                <a:cs typeface="Courier New" panose="02070309020205020404" pitchFamily="49" charset="0"/>
+              </a:endParaRPr>
+            </a:p>
+            <a:p>
+              <a:r>
+                <a:rPr lang="en-US" sz="1600" b="1" dirty="0">
+                  <a:latin typeface="Courier New" panose="02070309020205020404" pitchFamily="49" charset="0"/>
+                  <a:cs typeface="Courier New" panose="02070309020205020404" pitchFamily="49" charset="0"/>
+                </a:rPr>
+                <a:t>Programmed by: Eng. Sami A. </a:t>
+              </a:r>
+              <a:r>
+                <a:rPr lang="en-US" sz="1600" b="1" dirty="0" err="1">
+                  <a:latin typeface="Courier New" panose="02070309020205020404" pitchFamily="49" charset="0"/>
+                  <a:cs typeface="Courier New" panose="02070309020205020404" pitchFamily="49" charset="0"/>
+                </a:rPr>
+                <a:t>Alfattani</a:t>
+              </a:r>
+              <a:endParaRPr lang="en-US" sz="1600" b="1" dirty="0">
+                <a:latin typeface="Courier New" panose="02070309020205020404" pitchFamily="49" charset="0"/>
+                <a:cs typeface="Courier New" panose="02070309020205020404" pitchFamily="49" charset="0"/>
+              </a:endParaRPr>
+            </a:p>
+            <a:p>
+              <a:r>
+                <a:rPr lang="en-US" sz="1600" b="1" dirty="0">
+                  <a:latin typeface="Courier New" panose="02070309020205020404" pitchFamily="49" charset="0"/>
+                  <a:cs typeface="Courier New" panose="02070309020205020404" pitchFamily="49" charset="0"/>
+                </a:rPr>
+                <a:t>Contact: </a:t>
+              </a:r>
+              <a:r>
+                <a:rPr lang="en-US" sz="1600" b="1" dirty="0">
+                  <a:solidFill>
+                    <a:srgbClr val="3366FF"/>
+                  </a:solidFill>
+                  <a:latin typeface="Courier New" panose="02070309020205020404" pitchFamily="49" charset="0"/>
+                  <a:cs typeface="Courier New" panose="02070309020205020404" pitchFamily="49" charset="0"/>
+                </a:rPr>
+                <a:t>Sami_Alfattani@hotmail.com</a:t>
+              </a:r>
+            </a:p>
+            <a:p>
+              <a:r>
+                <a:rPr lang="en-US" sz="1600" b="1" dirty="0">
+                  <a:latin typeface="Courier New" panose="02070309020205020404" pitchFamily="49" charset="0"/>
+                  <a:cs typeface="Courier New" panose="02070309020205020404" pitchFamily="49" charset="0"/>
+                </a:rPr>
+                <a:t>Mobile : +966-5-645-99127</a:t>
+              </a:r>
+            </a:p>
+          </p:txBody>
+        </p:sp>
+      </p:grpSp>
+    </p:spTree>
+    <p:extLst>
+      <p:ext uri="{BB962C8B-B14F-4D97-AF65-F5344CB8AC3E}">
+        <p14:creationId xmlns:p14="http://schemas.microsoft.com/office/powerpoint/2010/main" val="1522045633"/>
+      </p:ext>
+    </p:extLst>
+  </p:cSld>
+  <p:clrMapOvr>
+    <a:masterClrMapping/>
+  </p:clrMapOvr>
+</p:sld>
+</file>
+
+<file path=ppt/slides/slide11.xml><?xml version="1.0" encoding="utf-8"?>
+<p:sld xmlns:a="http://schemas.openxmlformats.org/drawingml/2006/main" xmlns:r="http://schemas.openxmlformats.org/officeDocument/2006/relationships" xmlns:p="http://schemas.openxmlformats.org/presentationml/2006/main">
+  <p:cSld>
+    <p:spTree>
+      <p:nvGrpSpPr>
+        <p:cNvPr id="1" name=""/>
+        <p:cNvGrpSpPr/>
+        <p:nvPr/>
+      </p:nvGrpSpPr>
+      <p:grpSpPr>
+        <a:xfrm>
+          <a:off x="0" y="0"/>
+          <a:ext cx="0" cy="0"/>
+          <a:chOff x="0" y="0"/>
+          <a:chExt cx="0" cy="0"/>
+        </a:xfrm>
+      </p:grpSpPr>
+      <p:grpSp>
+        <p:nvGrpSpPr>
+          <p:cNvPr id="6" name="Group 5"/>
+          <p:cNvGrpSpPr/>
+          <p:nvPr/>
+        </p:nvGrpSpPr>
+        <p:grpSpPr>
+          <a:xfrm>
+            <a:off x="2084058" y="969093"/>
+            <a:ext cx="7634977" cy="3219846"/>
+            <a:chOff x="2084058" y="969093"/>
+            <a:chExt cx="7634977" cy="3219846"/>
+          </a:xfrm>
+        </p:grpSpPr>
+        <p:pic>
+          <p:nvPicPr>
+            <p:cNvPr id="2" name="Picture 1"/>
+            <p:cNvPicPr>
+              <a:picLocks noChangeAspect="1"/>
+            </p:cNvPicPr>
+            <p:nvPr/>
+          </p:nvPicPr>
+          <p:blipFill>
+            <a:blip r:embed="rId2"/>
+            <a:stretch>
+              <a:fillRect/>
+            </a:stretch>
+          </p:blipFill>
+          <p:spPr>
+            <a:xfrm>
+              <a:off x="2084058" y="969093"/>
+              <a:ext cx="7634977" cy="3206981"/>
+            </a:xfrm>
+            <a:prstGeom prst="rect">
+              <a:avLst/>
+            </a:prstGeom>
+          </p:spPr>
+        </p:pic>
+        <p:pic>
+          <p:nvPicPr>
+            <p:cNvPr id="3" name="Picture 2"/>
+            <p:cNvPicPr>
+              <a:picLocks noChangeAspect="1"/>
+            </p:cNvPicPr>
+            <p:nvPr/>
+          </p:nvPicPr>
+          <p:blipFill>
+            <a:blip r:embed="rId3">
+              <a:extLst>
+                <a:ext uri="{28A0092B-C50C-407E-A947-70E740481C1C}">
+                  <a14:useLocalDpi xmlns:a14="http://schemas.microsoft.com/office/drawing/2010/main" val="0"/>
+                </a:ext>
+              </a:extLst>
+            </a:blip>
+            <a:stretch>
+              <a:fillRect/>
+            </a:stretch>
+          </p:blipFill>
+          <p:spPr>
+            <a:xfrm>
+              <a:off x="2829212" y="1326617"/>
+              <a:ext cx="1176417" cy="1176417"/>
+            </a:xfrm>
+            <a:prstGeom prst="rect">
+              <a:avLst/>
+            </a:prstGeom>
+          </p:spPr>
+        </p:pic>
+        <p:sp>
+          <p:nvSpPr>
+            <p:cNvPr id="4" name="TextBox 3"/>
+            <p:cNvSpPr txBox="1"/>
+            <p:nvPr/>
+          </p:nvSpPr>
+          <p:spPr>
+            <a:xfrm>
+              <a:off x="2187757" y="2622802"/>
+              <a:ext cx="2459328" cy="1077218"/>
+            </a:xfrm>
+            <a:prstGeom prst="rect">
+              <a:avLst/>
+            </a:prstGeom>
+            <a:noFill/>
+          </p:spPr>
+          <p:txBody>
+            <a:bodyPr wrap="none" rtlCol="0">
+              <a:spAutoFit/>
+            </a:bodyPr>
+            <a:lstStyle/>
+            <a:p>
+              <a:pPr algn="ctr"/>
+              <a:r>
+                <a:rPr lang="en-US" sz="3200" dirty="0">
+                  <a:solidFill>
+                    <a:srgbClr val="3366FF"/>
+                  </a:solidFill>
+                  <a:latin typeface="Cooper Black" panose="0208090404030B020404" pitchFamily="18" charset="0"/>
+                </a:rPr>
+                <a:t>E-Quiz</a:t>
+              </a:r>
+            </a:p>
+            <a:p>
+              <a:r>
+                <a:rPr lang="en-US" sz="3200" dirty="0">
+                  <a:solidFill>
+                    <a:srgbClr val="3366FF"/>
+                  </a:solidFill>
+                  <a:latin typeface="Cooper Black" panose="0208090404030B020404" pitchFamily="18" charset="0"/>
+                </a:rPr>
+                <a:t>Client Side</a:t>
+              </a:r>
+            </a:p>
+          </p:txBody>
+        </p:sp>
+        <p:sp>
+          <p:nvSpPr>
+            <p:cNvPr id="5" name="TextBox 4"/>
+            <p:cNvSpPr txBox="1"/>
+            <p:nvPr/>
+          </p:nvSpPr>
+          <p:spPr>
+            <a:xfrm>
+              <a:off x="4719676" y="1326617"/>
+              <a:ext cx="4853532" cy="2862322"/>
+            </a:xfrm>
+            <a:prstGeom prst="rect">
+              <a:avLst/>
+            </a:prstGeom>
+            <a:noFill/>
+          </p:spPr>
+          <p:txBody>
+            <a:bodyPr wrap="square" rtlCol="0">
+              <a:spAutoFit/>
+            </a:bodyPr>
+            <a:lstStyle/>
+            <a:p>
+              <a:r>
+                <a:rPr lang="en-US" sz="1600" b="1" dirty="0">
+                  <a:latin typeface="Courier New" panose="02070309020205020404" pitchFamily="49" charset="0"/>
+                  <a:cs typeface="Courier New" panose="02070309020205020404" pitchFamily="49" charset="0"/>
+                </a:rPr>
+                <a:t>Version:</a:t>
+              </a:r>
+            </a:p>
+            <a:p>
+              <a:r>
+                <a:rPr lang="en-US" sz="1600" b="1" dirty="0">
+                  <a:latin typeface="Courier New" panose="02070309020205020404" pitchFamily="49" charset="0"/>
+                  <a:cs typeface="Courier New" panose="02070309020205020404" pitchFamily="49" charset="0"/>
+                </a:rPr>
+                <a:t>Release:</a:t>
+              </a:r>
+            </a:p>
+            <a:p>
+              <a:r>
+                <a:rPr lang="en-US" sz="1600" b="1" dirty="0">
+                  <a:latin typeface="Courier New" panose="02070309020205020404" pitchFamily="49" charset="0"/>
+                  <a:cs typeface="Courier New" panose="02070309020205020404" pitchFamily="49" charset="0"/>
+                </a:rPr>
+                <a:t>License: Freeware</a:t>
+              </a:r>
+            </a:p>
+            <a:p>
+              <a:endParaRPr lang="en-US" sz="1600" b="1" dirty="0">
+                <a:latin typeface="Courier New" panose="02070309020205020404" pitchFamily="49" charset="0"/>
+                <a:cs typeface="Courier New" panose="02070309020205020404" pitchFamily="49" charset="0"/>
+              </a:endParaRPr>
+            </a:p>
+            <a:p>
+              <a:endParaRPr lang="en-US" sz="1600" b="1" dirty="0">
+                <a:latin typeface="Courier New" panose="02070309020205020404" pitchFamily="49" charset="0"/>
+                <a:cs typeface="Courier New" panose="02070309020205020404" pitchFamily="49" charset="0"/>
+              </a:endParaRPr>
+            </a:p>
+            <a:p>
+              <a:r>
+                <a:rPr lang="en-US" sz="1600" b="1" dirty="0">
+                  <a:latin typeface="Courier New" panose="02070309020205020404" pitchFamily="49" charset="0"/>
+                  <a:cs typeface="Courier New" panose="02070309020205020404" pitchFamily="49" charset="0"/>
+                </a:rPr>
+                <a:t>Copyright </a:t>
+              </a:r>
+              <a:r>
+                <a:rPr lang="en-US" sz="2000" b="1" dirty="0">
+                  <a:latin typeface="Courier New" panose="02070309020205020404" pitchFamily="49" charset="0"/>
+                  <a:cs typeface="Courier New" panose="02070309020205020404" pitchFamily="49" charset="0"/>
+                </a:rPr>
+                <a:t>©</a:t>
+              </a:r>
+              <a:r>
+                <a:rPr lang="en-US" sz="1600" b="1" dirty="0">
+                  <a:latin typeface="Courier New" panose="02070309020205020404" pitchFamily="49" charset="0"/>
+                  <a:cs typeface="Courier New" panose="02070309020205020404" pitchFamily="49" charset="0"/>
+                </a:rPr>
+                <a:t> 2016-2020 Eng. Sami Alfattani. All Rights Received.</a:t>
               </a:r>
             </a:p>
             <a:p>

</xml_diff>